<commit_message>
Added Service endpoint with Azure firewall
</commit_message>
<xml_diff>
--- a/images/Azure Firewall.pptx
+++ b/images/Azure Firewall.pptx
@@ -5,9 +5,10 @@
     <p:sldMasterId id="2147483648" r:id="rId1"/>
   </p:sldMasterIdLst>
   <p:sldIdLst>
-    <p:sldId id="258" r:id="rId2"/>
-    <p:sldId id="259" r:id="rId3"/>
-    <p:sldId id="260" r:id="rId4"/>
+    <p:sldId id="261" r:id="rId2"/>
+    <p:sldId id="258" r:id="rId3"/>
+    <p:sldId id="259" r:id="rId4"/>
+    <p:sldId id="260" r:id="rId5"/>
   </p:sldIdLst>
   <p:sldSz cx="12192000" cy="6858000"/>
   <p:notesSz cx="6858000" cy="9144000"/>
@@ -263,7 +264,7 @@
           <a:p>
             <a:fld id="{BF3F27D8-FD3A-40AA-9727-2773807CBD8D}" type="datetimeFigureOut">
               <a:rPr lang="en-CA" smtClean="0"/>
-              <a:t>2021-05-10</a:t>
+              <a:t>2021-05-13</a:t>
             </a:fld>
             <a:endParaRPr lang="en-CA"/>
           </a:p>
@@ -463,7 +464,7 @@
           <a:p>
             <a:fld id="{BF3F27D8-FD3A-40AA-9727-2773807CBD8D}" type="datetimeFigureOut">
               <a:rPr lang="en-CA" smtClean="0"/>
-              <a:t>2021-05-10</a:t>
+              <a:t>2021-05-13</a:t>
             </a:fld>
             <a:endParaRPr lang="en-CA"/>
           </a:p>
@@ -673,7 +674,7 @@
           <a:p>
             <a:fld id="{BF3F27D8-FD3A-40AA-9727-2773807CBD8D}" type="datetimeFigureOut">
               <a:rPr lang="en-CA" smtClean="0"/>
-              <a:t>2021-05-10</a:t>
+              <a:t>2021-05-13</a:t>
             </a:fld>
             <a:endParaRPr lang="en-CA"/>
           </a:p>
@@ -873,7 +874,7 @@
           <a:p>
             <a:fld id="{BF3F27D8-FD3A-40AA-9727-2773807CBD8D}" type="datetimeFigureOut">
               <a:rPr lang="en-CA" smtClean="0"/>
-              <a:t>2021-05-10</a:t>
+              <a:t>2021-05-13</a:t>
             </a:fld>
             <a:endParaRPr lang="en-CA"/>
           </a:p>
@@ -1149,7 +1150,7 @@
           <a:p>
             <a:fld id="{BF3F27D8-FD3A-40AA-9727-2773807CBD8D}" type="datetimeFigureOut">
               <a:rPr lang="en-CA" smtClean="0"/>
-              <a:t>2021-05-10</a:t>
+              <a:t>2021-05-13</a:t>
             </a:fld>
             <a:endParaRPr lang="en-CA"/>
           </a:p>
@@ -1417,7 +1418,7 @@
           <a:p>
             <a:fld id="{BF3F27D8-FD3A-40AA-9727-2773807CBD8D}" type="datetimeFigureOut">
               <a:rPr lang="en-CA" smtClean="0"/>
-              <a:t>2021-05-10</a:t>
+              <a:t>2021-05-13</a:t>
             </a:fld>
             <a:endParaRPr lang="en-CA"/>
           </a:p>
@@ -1832,7 +1833,7 @@
           <a:p>
             <a:fld id="{BF3F27D8-FD3A-40AA-9727-2773807CBD8D}" type="datetimeFigureOut">
               <a:rPr lang="en-CA" smtClean="0"/>
-              <a:t>2021-05-10</a:t>
+              <a:t>2021-05-13</a:t>
             </a:fld>
             <a:endParaRPr lang="en-CA"/>
           </a:p>
@@ -1974,7 +1975,7 @@
           <a:p>
             <a:fld id="{BF3F27D8-FD3A-40AA-9727-2773807CBD8D}" type="datetimeFigureOut">
               <a:rPr lang="en-CA" smtClean="0"/>
-              <a:t>2021-05-10</a:t>
+              <a:t>2021-05-13</a:t>
             </a:fld>
             <a:endParaRPr lang="en-CA"/>
           </a:p>
@@ -2087,7 +2088,7 @@
           <a:p>
             <a:fld id="{BF3F27D8-FD3A-40AA-9727-2773807CBD8D}" type="datetimeFigureOut">
               <a:rPr lang="en-CA" smtClean="0"/>
-              <a:t>2021-05-10</a:t>
+              <a:t>2021-05-13</a:t>
             </a:fld>
             <a:endParaRPr lang="en-CA"/>
           </a:p>
@@ -2400,7 +2401,7 @@
           <a:p>
             <a:fld id="{BF3F27D8-FD3A-40AA-9727-2773807CBD8D}" type="datetimeFigureOut">
               <a:rPr lang="en-CA" smtClean="0"/>
-              <a:t>2021-05-10</a:t>
+              <a:t>2021-05-13</a:t>
             </a:fld>
             <a:endParaRPr lang="en-CA"/>
           </a:p>
@@ -2689,7 +2690,7 @@
           <a:p>
             <a:fld id="{BF3F27D8-FD3A-40AA-9727-2773807CBD8D}" type="datetimeFigureOut">
               <a:rPr lang="en-CA" smtClean="0"/>
-              <a:t>2021-05-10</a:t>
+              <a:t>2021-05-13</a:t>
             </a:fld>
             <a:endParaRPr lang="en-CA"/>
           </a:p>
@@ -2932,7 +2933,7 @@
           <a:p>
             <a:fld id="{BF3F27D8-FD3A-40AA-9727-2773807CBD8D}" type="datetimeFigureOut">
               <a:rPr lang="en-CA" smtClean="0"/>
-              <a:t>2021-05-10</a:t>
+              <a:t>2021-05-13</a:t>
             </a:fld>
             <a:endParaRPr lang="en-CA"/>
           </a:p>
@@ -3333,6 +3334,3007 @@
 </file>
 
 <file path=ppt/slides/slide1.xml><?xml version="1.0" encoding="utf-8"?>
+<p:sld xmlns:a="http://schemas.openxmlformats.org/drawingml/2006/main" xmlns:r="http://schemas.openxmlformats.org/officeDocument/2006/relationships" xmlns:p="http://schemas.openxmlformats.org/presentationml/2006/main">
+  <p:cSld>
+    <p:spTree>
+      <p:nvGrpSpPr>
+        <p:cNvPr id="1" name=""/>
+        <p:cNvGrpSpPr/>
+        <p:nvPr/>
+      </p:nvGrpSpPr>
+      <p:grpSpPr>
+        <a:xfrm>
+          <a:off x="0" y="0"/>
+          <a:ext cx="0" cy="0"/>
+          <a:chOff x="0" y="0"/>
+          <a:chExt cx="0" cy="0"/>
+        </a:xfrm>
+      </p:grpSpPr>
+      <p:grpSp>
+        <p:nvGrpSpPr>
+          <p:cNvPr id="38" name="Group 37">
+            <a:extLst>
+              <a:ext uri="{FF2B5EF4-FFF2-40B4-BE49-F238E27FC236}">
+                <a16:creationId xmlns:a16="http://schemas.microsoft.com/office/drawing/2014/main" id="{C5F4BD92-6EC8-4549-834B-B939246D8F40}"/>
+              </a:ext>
+            </a:extLst>
+          </p:cNvPr>
+          <p:cNvGrpSpPr/>
+          <p:nvPr/>
+        </p:nvGrpSpPr>
+        <p:grpSpPr>
+          <a:xfrm>
+            <a:off x="5498836" y="1528720"/>
+            <a:ext cx="2807379" cy="2379543"/>
+            <a:chOff x="4236132" y="2642781"/>
+            <a:chExt cx="2807379" cy="2379543"/>
+          </a:xfrm>
+        </p:grpSpPr>
+        <p:sp>
+          <p:nvSpPr>
+            <p:cNvPr id="7" name="Rectangle 6">
+              <a:extLst>
+                <a:ext uri="{FF2B5EF4-FFF2-40B4-BE49-F238E27FC236}">
+                  <a16:creationId xmlns:a16="http://schemas.microsoft.com/office/drawing/2014/main" id="{CAEA87A2-AF36-479D-B731-F40E6363E16F}"/>
+                </a:ext>
+              </a:extLst>
+            </p:cNvPr>
+            <p:cNvSpPr/>
+            <p:nvPr/>
+          </p:nvSpPr>
+          <p:spPr>
+            <a:xfrm>
+              <a:off x="4258246" y="2991779"/>
+              <a:ext cx="2763151" cy="2030545"/>
+            </a:xfrm>
+            <a:prstGeom prst="rect">
+              <a:avLst/>
+            </a:prstGeom>
+            <a:noFill/>
+            <a:ln>
+              <a:prstDash val="lgDash"/>
+            </a:ln>
+          </p:spPr>
+          <p:style>
+            <a:lnRef idx="2">
+              <a:schemeClr val="accent1">
+                <a:shade val="50000"/>
+              </a:schemeClr>
+            </a:lnRef>
+            <a:fillRef idx="1">
+              <a:schemeClr val="accent1"/>
+            </a:fillRef>
+            <a:effectRef idx="0">
+              <a:schemeClr val="accent1"/>
+            </a:effectRef>
+            <a:fontRef idx="minor">
+              <a:schemeClr val="lt1"/>
+            </a:fontRef>
+          </p:style>
+          <p:txBody>
+            <a:bodyPr rtlCol="0" anchor="ctr"/>
+            <a:lstStyle/>
+            <a:p>
+              <a:pPr algn="ctr"/>
+              <a:endParaRPr lang="en-CA"/>
+            </a:p>
+          </p:txBody>
+        </p:sp>
+        <p:grpSp>
+          <p:nvGrpSpPr>
+            <p:cNvPr id="8" name="Group 7">
+              <a:extLst>
+                <a:ext uri="{FF2B5EF4-FFF2-40B4-BE49-F238E27FC236}">
+                  <a16:creationId xmlns:a16="http://schemas.microsoft.com/office/drawing/2014/main" id="{8F741CA6-ADEE-47DD-84E9-F2265C95C240}"/>
+                </a:ext>
+              </a:extLst>
+            </p:cNvPr>
+            <p:cNvGrpSpPr/>
+            <p:nvPr/>
+          </p:nvGrpSpPr>
+          <p:grpSpPr>
+            <a:xfrm>
+              <a:off x="4236132" y="2749127"/>
+              <a:ext cx="1633502" cy="488729"/>
+              <a:chOff x="4649644" y="3825726"/>
+              <a:chExt cx="1633502" cy="488729"/>
+            </a:xfrm>
+          </p:grpSpPr>
+          <p:pic>
+            <p:nvPicPr>
+              <p:cNvPr id="28" name="Picture 27" descr="Icon&#10;&#10;Description automatically generated">
+                <a:extLst>
+                  <a:ext uri="{FF2B5EF4-FFF2-40B4-BE49-F238E27FC236}">
+                    <a16:creationId xmlns:a16="http://schemas.microsoft.com/office/drawing/2014/main" id="{23A6B63F-E385-4B2C-82D5-87ABDE40C8A1}"/>
+                  </a:ext>
+                </a:extLst>
+              </p:cNvPr>
+              <p:cNvPicPr>
+                <a:picLocks noChangeAspect="1"/>
+              </p:cNvPicPr>
+              <p:nvPr/>
+            </p:nvPicPr>
+            <p:blipFill>
+              <a:blip r:embed="rId2">
+                <a:extLst>
+                  <a:ext uri="{28A0092B-C50C-407E-A947-70E740481C1C}">
+                    <a14:useLocalDpi xmlns:a14="http://schemas.microsoft.com/office/drawing/2010/main" val="0"/>
+                  </a:ext>
+                </a:extLst>
+              </a:blip>
+              <a:stretch>
+                <a:fillRect/>
+              </a:stretch>
+            </p:blipFill>
+            <p:spPr>
+              <a:xfrm>
+                <a:off x="4649644" y="3833117"/>
+                <a:ext cx="481338" cy="481338"/>
+              </a:xfrm>
+              <a:prstGeom prst="rect">
+                <a:avLst/>
+              </a:prstGeom>
+            </p:spPr>
+          </p:pic>
+          <p:sp>
+            <p:nvSpPr>
+              <p:cNvPr id="29" name="Rectangle 28">
+                <a:extLst>
+                  <a:ext uri="{FF2B5EF4-FFF2-40B4-BE49-F238E27FC236}">
+                    <a16:creationId xmlns:a16="http://schemas.microsoft.com/office/drawing/2014/main" id="{41297575-5E61-4BDD-A9DA-D0DB9D14763A}"/>
+                  </a:ext>
+                </a:extLst>
+              </p:cNvPr>
+              <p:cNvSpPr/>
+              <p:nvPr/>
+            </p:nvSpPr>
+            <p:spPr>
+              <a:xfrm>
+                <a:off x="4998629" y="3825726"/>
+                <a:ext cx="1284517" cy="342457"/>
+              </a:xfrm>
+              <a:prstGeom prst="rect">
+                <a:avLst/>
+              </a:prstGeom>
+              <a:noFill/>
+              <a:ln>
+                <a:noFill/>
+              </a:ln>
+            </p:spPr>
+            <p:style>
+              <a:lnRef idx="2">
+                <a:schemeClr val="accent1">
+                  <a:shade val="50000"/>
+                </a:schemeClr>
+              </a:lnRef>
+              <a:fillRef idx="1">
+                <a:schemeClr val="accent1"/>
+              </a:fillRef>
+              <a:effectRef idx="0">
+                <a:schemeClr val="accent1"/>
+              </a:effectRef>
+              <a:fontRef idx="minor">
+                <a:schemeClr val="lt1"/>
+              </a:fontRef>
+            </p:style>
+            <p:txBody>
+              <a:bodyPr rtlCol="0" anchor="ctr"/>
+              <a:lstStyle/>
+              <a:p>
+                <a:pPr algn="ctr"/>
+                <a:r>
+                  <a:rPr lang="en-CA" sz="1000" b="1" dirty="0">
+                    <a:solidFill>
+                      <a:schemeClr val="tx1"/>
+                    </a:solidFill>
+                  </a:rPr>
+                  <a:t>VNet – 10.0.0.0/16</a:t>
+                </a:r>
+              </a:p>
+            </p:txBody>
+          </p:sp>
+        </p:grpSp>
+        <p:sp>
+          <p:nvSpPr>
+            <p:cNvPr id="11" name="Rectangle 10">
+              <a:extLst>
+                <a:ext uri="{FF2B5EF4-FFF2-40B4-BE49-F238E27FC236}">
+                  <a16:creationId xmlns:a16="http://schemas.microsoft.com/office/drawing/2014/main" id="{B202F45B-86F7-45C8-B28A-01ED83AAD24B}"/>
+                </a:ext>
+              </a:extLst>
+            </p:cNvPr>
+            <p:cNvSpPr/>
+            <p:nvPr/>
+          </p:nvSpPr>
+          <p:spPr>
+            <a:xfrm>
+              <a:off x="4381915" y="3402988"/>
+              <a:ext cx="2393354" cy="1393945"/>
+            </a:xfrm>
+            <a:prstGeom prst="rect">
+              <a:avLst/>
+            </a:prstGeom>
+            <a:noFill/>
+            <a:ln>
+              <a:prstDash val="lgDash"/>
+            </a:ln>
+          </p:spPr>
+          <p:style>
+            <a:lnRef idx="2">
+              <a:schemeClr val="accent1">
+                <a:shade val="50000"/>
+              </a:schemeClr>
+            </a:lnRef>
+            <a:fillRef idx="1">
+              <a:schemeClr val="accent1"/>
+            </a:fillRef>
+            <a:effectRef idx="0">
+              <a:schemeClr val="accent1"/>
+            </a:effectRef>
+            <a:fontRef idx="minor">
+              <a:schemeClr val="lt1"/>
+            </a:fontRef>
+          </p:style>
+          <p:txBody>
+            <a:bodyPr rtlCol="0" anchor="ctr"/>
+            <a:lstStyle/>
+            <a:p>
+              <a:pPr algn="ctr"/>
+              <a:endParaRPr lang="en-CA"/>
+            </a:p>
+          </p:txBody>
+        </p:sp>
+        <p:grpSp>
+          <p:nvGrpSpPr>
+            <p:cNvPr id="15" name="Group 14">
+              <a:extLst>
+                <a:ext uri="{FF2B5EF4-FFF2-40B4-BE49-F238E27FC236}">
+                  <a16:creationId xmlns:a16="http://schemas.microsoft.com/office/drawing/2014/main" id="{78BE77B9-F713-4EBF-9B44-E7A3EAB023AE}"/>
+                </a:ext>
+              </a:extLst>
+            </p:cNvPr>
+            <p:cNvGrpSpPr/>
+            <p:nvPr/>
+          </p:nvGrpSpPr>
+          <p:grpSpPr>
+            <a:xfrm>
+              <a:off x="6245199" y="4202515"/>
+              <a:ext cx="798312" cy="759550"/>
+              <a:chOff x="10481349" y="5875433"/>
+              <a:chExt cx="798312" cy="759550"/>
+            </a:xfrm>
+          </p:grpSpPr>
+          <p:sp>
+            <p:nvSpPr>
+              <p:cNvPr id="20" name="Rectangle 19">
+                <a:extLst>
+                  <a:ext uri="{FF2B5EF4-FFF2-40B4-BE49-F238E27FC236}">
+                    <a16:creationId xmlns:a16="http://schemas.microsoft.com/office/drawing/2014/main" id="{8332E4C7-9FA1-4305-BB92-6066FC3185A5}"/>
+                  </a:ext>
+                </a:extLst>
+              </p:cNvPr>
+              <p:cNvSpPr/>
+              <p:nvPr/>
+            </p:nvSpPr>
+            <p:spPr>
+              <a:xfrm>
+                <a:off x="10481349" y="6349232"/>
+                <a:ext cx="798312" cy="285751"/>
+              </a:xfrm>
+              <a:prstGeom prst="rect">
+                <a:avLst/>
+              </a:prstGeom>
+              <a:noFill/>
+              <a:ln>
+                <a:noFill/>
+              </a:ln>
+            </p:spPr>
+            <p:style>
+              <a:lnRef idx="2">
+                <a:schemeClr val="accent1">
+                  <a:shade val="50000"/>
+                </a:schemeClr>
+              </a:lnRef>
+              <a:fillRef idx="1">
+                <a:schemeClr val="accent1"/>
+              </a:fillRef>
+              <a:effectRef idx="0">
+                <a:schemeClr val="accent1"/>
+              </a:effectRef>
+              <a:fontRef idx="minor">
+                <a:schemeClr val="lt1"/>
+              </a:fontRef>
+            </p:style>
+            <p:txBody>
+              <a:bodyPr rtlCol="0" anchor="ctr"/>
+              <a:lstStyle/>
+              <a:p>
+                <a:pPr algn="ctr"/>
+                <a:r>
+                  <a:rPr lang="en-CA" sz="1000" b="1" dirty="0">
+                    <a:solidFill>
+                      <a:schemeClr val="tx1"/>
+                    </a:solidFill>
+                  </a:rPr>
+                  <a:t>Service Endpoint</a:t>
+                </a:r>
+              </a:p>
+            </p:txBody>
+          </p:sp>
+          <p:pic>
+            <p:nvPicPr>
+              <p:cNvPr id="21" name="Graphic 20">
+                <a:extLst>
+                  <a:ext uri="{FF2B5EF4-FFF2-40B4-BE49-F238E27FC236}">
+                    <a16:creationId xmlns:a16="http://schemas.microsoft.com/office/drawing/2014/main" id="{712CEBC5-2A44-464A-A699-32F3F789B672}"/>
+                  </a:ext>
+                </a:extLst>
+              </p:cNvPr>
+              <p:cNvPicPr>
+                <a:picLocks noChangeAspect="1"/>
+              </p:cNvPicPr>
+              <p:nvPr/>
+            </p:nvPicPr>
+            <p:blipFill>
+              <a:blip r:embed="rId3">
+                <a:extLst>
+                  <a:ext uri="{28A0092B-C50C-407E-A947-70E740481C1C}">
+                    <a14:useLocalDpi xmlns:a14="http://schemas.microsoft.com/office/drawing/2010/main" val="0"/>
+                  </a:ext>
+                  <a:ext uri="{96DAC541-7B7A-43D3-8B79-37D633B846F1}">
+                    <asvg:svgBlip xmlns:asvg="http://schemas.microsoft.com/office/drawing/2016/SVG/main" r:embed="rId4"/>
+                  </a:ext>
+                </a:extLst>
+              </a:blip>
+              <a:stretch>
+                <a:fillRect/>
+              </a:stretch>
+            </p:blipFill>
+            <p:spPr>
+              <a:xfrm>
+                <a:off x="10698905" y="5875433"/>
+                <a:ext cx="476250" cy="476250"/>
+              </a:xfrm>
+              <a:prstGeom prst="rect">
+                <a:avLst/>
+              </a:prstGeom>
+            </p:spPr>
+          </p:pic>
+        </p:grpSp>
+        <p:sp>
+          <p:nvSpPr>
+            <p:cNvPr id="30" name="Rectangle 29">
+              <a:extLst>
+                <a:ext uri="{FF2B5EF4-FFF2-40B4-BE49-F238E27FC236}">
+                  <a16:creationId xmlns:a16="http://schemas.microsoft.com/office/drawing/2014/main" id="{D2BC5263-5F4F-486A-8174-4575FE4E8014}"/>
+                </a:ext>
+              </a:extLst>
+            </p:cNvPr>
+            <p:cNvSpPr/>
+            <p:nvPr/>
+          </p:nvSpPr>
+          <p:spPr>
+            <a:xfrm>
+              <a:off x="4285608" y="3180695"/>
+              <a:ext cx="1354213" cy="281638"/>
+            </a:xfrm>
+            <a:prstGeom prst="rect">
+              <a:avLst/>
+            </a:prstGeom>
+            <a:noFill/>
+            <a:ln>
+              <a:noFill/>
+            </a:ln>
+          </p:spPr>
+          <p:style>
+            <a:lnRef idx="2">
+              <a:schemeClr val="accent1">
+                <a:shade val="50000"/>
+              </a:schemeClr>
+            </a:lnRef>
+            <a:fillRef idx="1">
+              <a:schemeClr val="accent1"/>
+            </a:fillRef>
+            <a:effectRef idx="0">
+              <a:schemeClr val="accent1"/>
+            </a:effectRef>
+            <a:fontRef idx="minor">
+              <a:schemeClr val="lt1"/>
+            </a:fontRef>
+          </p:style>
+          <p:txBody>
+            <a:bodyPr rtlCol="0" anchor="ctr"/>
+            <a:lstStyle/>
+            <a:p>
+              <a:pPr algn="ctr"/>
+              <a:r>
+                <a:rPr lang="en-CA" sz="1000" b="1" dirty="0">
+                  <a:solidFill>
+                    <a:schemeClr val="tx1"/>
+                  </a:solidFill>
+                </a:rPr>
+                <a:t>Subnet – 10.0.0.0/24</a:t>
+              </a:r>
+            </a:p>
+          </p:txBody>
+        </p:sp>
+        <p:sp>
+          <p:nvSpPr>
+            <p:cNvPr id="31" name="Rectangle 30">
+              <a:extLst>
+                <a:ext uri="{FF2B5EF4-FFF2-40B4-BE49-F238E27FC236}">
+                  <a16:creationId xmlns:a16="http://schemas.microsoft.com/office/drawing/2014/main" id="{E4DD2164-5928-4A98-AFA5-A5339F39756C}"/>
+                </a:ext>
+              </a:extLst>
+            </p:cNvPr>
+            <p:cNvSpPr/>
+            <p:nvPr/>
+          </p:nvSpPr>
+          <p:spPr>
+            <a:xfrm>
+              <a:off x="4556635" y="2642781"/>
+              <a:ext cx="1284517" cy="251870"/>
+            </a:xfrm>
+            <a:prstGeom prst="rect">
+              <a:avLst/>
+            </a:prstGeom>
+            <a:noFill/>
+            <a:ln>
+              <a:noFill/>
+            </a:ln>
+          </p:spPr>
+          <p:style>
+            <a:lnRef idx="2">
+              <a:schemeClr val="accent1">
+                <a:shade val="50000"/>
+              </a:schemeClr>
+            </a:lnRef>
+            <a:fillRef idx="1">
+              <a:schemeClr val="accent1"/>
+            </a:fillRef>
+            <a:effectRef idx="0">
+              <a:schemeClr val="accent1"/>
+            </a:effectRef>
+            <a:fontRef idx="minor">
+              <a:schemeClr val="lt1"/>
+            </a:fontRef>
+          </p:style>
+          <p:txBody>
+            <a:bodyPr rtlCol="0" anchor="ctr"/>
+            <a:lstStyle/>
+            <a:p>
+              <a:pPr algn="ctr"/>
+              <a:r>
+                <a:rPr lang="en-CA" sz="1000" b="1" dirty="0">
+                  <a:solidFill>
+                    <a:schemeClr val="tx1"/>
+                  </a:solidFill>
+                </a:rPr>
+                <a:t>Hub VNet - Firewall</a:t>
+              </a:r>
+            </a:p>
+          </p:txBody>
+        </p:sp>
+        <p:grpSp>
+          <p:nvGrpSpPr>
+            <p:cNvPr id="37" name="Group 36">
+              <a:extLst>
+                <a:ext uri="{FF2B5EF4-FFF2-40B4-BE49-F238E27FC236}">
+                  <a16:creationId xmlns:a16="http://schemas.microsoft.com/office/drawing/2014/main" id="{4889FD0F-D741-49FE-B1BA-5A401E283CF6}"/>
+                </a:ext>
+              </a:extLst>
+            </p:cNvPr>
+            <p:cNvGrpSpPr/>
+            <p:nvPr/>
+          </p:nvGrpSpPr>
+          <p:grpSpPr>
+            <a:xfrm>
+              <a:off x="5052077" y="3627465"/>
+              <a:ext cx="937793" cy="899722"/>
+              <a:chOff x="8852382" y="4748380"/>
+              <a:chExt cx="937793" cy="899722"/>
+            </a:xfrm>
+          </p:grpSpPr>
+          <p:pic>
+            <p:nvPicPr>
+              <p:cNvPr id="35" name="Graphic 34">
+                <a:extLst>
+                  <a:ext uri="{FF2B5EF4-FFF2-40B4-BE49-F238E27FC236}">
+                    <a16:creationId xmlns:a16="http://schemas.microsoft.com/office/drawing/2014/main" id="{4E334807-EC7E-4FB8-A584-D410446DB84E}"/>
+                  </a:ext>
+                </a:extLst>
+              </p:cNvPr>
+              <p:cNvPicPr>
+                <a:picLocks noChangeAspect="1"/>
+              </p:cNvPicPr>
+              <p:nvPr/>
+            </p:nvPicPr>
+            <p:blipFill>
+              <a:blip r:embed="rId5">
+                <a:extLst>
+                  <a:ext uri="{28A0092B-C50C-407E-A947-70E740481C1C}">
+                    <a14:useLocalDpi xmlns:a14="http://schemas.microsoft.com/office/drawing/2010/main" val="0"/>
+                  </a:ext>
+                  <a:ext uri="{96DAC541-7B7A-43D3-8B79-37D633B846F1}">
+                    <asvg:svgBlip xmlns:asvg="http://schemas.microsoft.com/office/drawing/2016/SVG/main" r:embed="rId6"/>
+                  </a:ext>
+                </a:extLst>
+              </a:blip>
+              <a:stretch>
+                <a:fillRect/>
+              </a:stretch>
+            </p:blipFill>
+            <p:spPr>
+              <a:xfrm>
+                <a:off x="9030464" y="4748380"/>
+                <a:ext cx="696866" cy="696866"/>
+              </a:xfrm>
+              <a:prstGeom prst="rect">
+                <a:avLst/>
+              </a:prstGeom>
+            </p:spPr>
+          </p:pic>
+          <p:sp>
+            <p:nvSpPr>
+              <p:cNvPr id="36" name="Rectangle 35">
+                <a:extLst>
+                  <a:ext uri="{FF2B5EF4-FFF2-40B4-BE49-F238E27FC236}">
+                    <a16:creationId xmlns:a16="http://schemas.microsoft.com/office/drawing/2014/main" id="{A55DE8C2-EBC3-4965-A34A-52C4786636B8}"/>
+                  </a:ext>
+                </a:extLst>
+              </p:cNvPr>
+              <p:cNvSpPr/>
+              <p:nvPr/>
+            </p:nvSpPr>
+            <p:spPr>
+              <a:xfrm>
+                <a:off x="8852382" y="5362351"/>
+                <a:ext cx="937793" cy="285751"/>
+              </a:xfrm>
+              <a:prstGeom prst="rect">
+                <a:avLst/>
+              </a:prstGeom>
+              <a:noFill/>
+              <a:ln>
+                <a:noFill/>
+              </a:ln>
+            </p:spPr>
+            <p:style>
+              <a:lnRef idx="2">
+                <a:schemeClr val="accent1">
+                  <a:shade val="50000"/>
+                </a:schemeClr>
+              </a:lnRef>
+              <a:fillRef idx="1">
+                <a:schemeClr val="accent1"/>
+              </a:fillRef>
+              <a:effectRef idx="0">
+                <a:schemeClr val="accent1"/>
+              </a:effectRef>
+              <a:fontRef idx="minor">
+                <a:schemeClr val="lt1"/>
+              </a:fontRef>
+            </p:style>
+            <p:txBody>
+              <a:bodyPr rtlCol="0" anchor="ctr"/>
+              <a:lstStyle/>
+              <a:p>
+                <a:pPr algn="ctr"/>
+                <a:r>
+                  <a:rPr lang="en-CA" sz="1000" b="1" dirty="0">
+                    <a:solidFill>
+                      <a:schemeClr val="tx1"/>
+                    </a:solidFill>
+                  </a:rPr>
+                  <a:t>Azure Firewall</a:t>
+                </a:r>
+              </a:p>
+            </p:txBody>
+          </p:sp>
+        </p:grpSp>
+      </p:grpSp>
+      <p:grpSp>
+        <p:nvGrpSpPr>
+          <p:cNvPr id="55" name="Group 54">
+            <a:extLst>
+              <a:ext uri="{FF2B5EF4-FFF2-40B4-BE49-F238E27FC236}">
+                <a16:creationId xmlns:a16="http://schemas.microsoft.com/office/drawing/2014/main" id="{159552CB-20F0-4F59-8A2E-F886E638D3F8}"/>
+              </a:ext>
+            </a:extLst>
+          </p:cNvPr>
+          <p:cNvGrpSpPr/>
+          <p:nvPr/>
+        </p:nvGrpSpPr>
+        <p:grpSpPr>
+          <a:xfrm>
+            <a:off x="1097866" y="1528720"/>
+            <a:ext cx="2785265" cy="2379543"/>
+            <a:chOff x="861561" y="687707"/>
+            <a:chExt cx="2785265" cy="2379543"/>
+          </a:xfrm>
+        </p:grpSpPr>
+        <p:sp>
+          <p:nvSpPr>
+            <p:cNvPr id="40" name="Rectangle 39">
+              <a:extLst>
+                <a:ext uri="{FF2B5EF4-FFF2-40B4-BE49-F238E27FC236}">
+                  <a16:creationId xmlns:a16="http://schemas.microsoft.com/office/drawing/2014/main" id="{66AAE84F-634F-497D-A893-B265E2576D16}"/>
+                </a:ext>
+              </a:extLst>
+            </p:cNvPr>
+            <p:cNvSpPr/>
+            <p:nvPr/>
+          </p:nvSpPr>
+          <p:spPr>
+            <a:xfrm>
+              <a:off x="883675" y="1036705"/>
+              <a:ext cx="2763151" cy="2030545"/>
+            </a:xfrm>
+            <a:prstGeom prst="rect">
+              <a:avLst/>
+            </a:prstGeom>
+            <a:noFill/>
+            <a:ln>
+              <a:prstDash val="lgDash"/>
+            </a:ln>
+          </p:spPr>
+          <p:style>
+            <a:lnRef idx="2">
+              <a:schemeClr val="accent1">
+                <a:shade val="50000"/>
+              </a:schemeClr>
+            </a:lnRef>
+            <a:fillRef idx="1">
+              <a:schemeClr val="accent1"/>
+            </a:fillRef>
+            <a:effectRef idx="0">
+              <a:schemeClr val="accent1"/>
+            </a:effectRef>
+            <a:fontRef idx="minor">
+              <a:schemeClr val="lt1"/>
+            </a:fontRef>
+          </p:style>
+          <p:txBody>
+            <a:bodyPr rtlCol="0" anchor="ctr"/>
+            <a:lstStyle/>
+            <a:p>
+              <a:pPr algn="ctr"/>
+              <a:endParaRPr lang="en-CA"/>
+            </a:p>
+          </p:txBody>
+        </p:sp>
+        <p:grpSp>
+          <p:nvGrpSpPr>
+            <p:cNvPr id="41" name="Group 40">
+              <a:extLst>
+                <a:ext uri="{FF2B5EF4-FFF2-40B4-BE49-F238E27FC236}">
+                  <a16:creationId xmlns:a16="http://schemas.microsoft.com/office/drawing/2014/main" id="{E912C68D-B9DE-447B-9EF8-687C9332F19C}"/>
+                </a:ext>
+              </a:extLst>
+            </p:cNvPr>
+            <p:cNvGrpSpPr/>
+            <p:nvPr/>
+          </p:nvGrpSpPr>
+          <p:grpSpPr>
+            <a:xfrm>
+              <a:off x="861561" y="794053"/>
+              <a:ext cx="1633502" cy="488729"/>
+              <a:chOff x="4649644" y="3825726"/>
+              <a:chExt cx="1633502" cy="488729"/>
+            </a:xfrm>
+          </p:grpSpPr>
+          <p:pic>
+            <p:nvPicPr>
+              <p:cNvPr id="51" name="Picture 50" descr="Icon&#10;&#10;Description automatically generated">
+                <a:extLst>
+                  <a:ext uri="{FF2B5EF4-FFF2-40B4-BE49-F238E27FC236}">
+                    <a16:creationId xmlns:a16="http://schemas.microsoft.com/office/drawing/2014/main" id="{B39E9001-1B4E-43AA-957D-F2AEF41FE60D}"/>
+                  </a:ext>
+                </a:extLst>
+              </p:cNvPr>
+              <p:cNvPicPr>
+                <a:picLocks noChangeAspect="1"/>
+              </p:cNvPicPr>
+              <p:nvPr/>
+            </p:nvPicPr>
+            <p:blipFill>
+              <a:blip r:embed="rId2">
+                <a:extLst>
+                  <a:ext uri="{28A0092B-C50C-407E-A947-70E740481C1C}">
+                    <a14:useLocalDpi xmlns:a14="http://schemas.microsoft.com/office/drawing/2010/main" val="0"/>
+                  </a:ext>
+                </a:extLst>
+              </a:blip>
+              <a:stretch>
+                <a:fillRect/>
+              </a:stretch>
+            </p:blipFill>
+            <p:spPr>
+              <a:xfrm>
+                <a:off x="4649644" y="3833117"/>
+                <a:ext cx="481338" cy="481338"/>
+              </a:xfrm>
+              <a:prstGeom prst="rect">
+                <a:avLst/>
+              </a:prstGeom>
+            </p:spPr>
+          </p:pic>
+          <p:sp>
+            <p:nvSpPr>
+              <p:cNvPr id="52" name="Rectangle 51">
+                <a:extLst>
+                  <a:ext uri="{FF2B5EF4-FFF2-40B4-BE49-F238E27FC236}">
+                    <a16:creationId xmlns:a16="http://schemas.microsoft.com/office/drawing/2014/main" id="{3F533914-517F-405C-9B92-E0365AFF6922}"/>
+                  </a:ext>
+                </a:extLst>
+              </p:cNvPr>
+              <p:cNvSpPr/>
+              <p:nvPr/>
+            </p:nvSpPr>
+            <p:spPr>
+              <a:xfrm>
+                <a:off x="4998629" y="3825726"/>
+                <a:ext cx="1284517" cy="342457"/>
+              </a:xfrm>
+              <a:prstGeom prst="rect">
+                <a:avLst/>
+              </a:prstGeom>
+              <a:noFill/>
+              <a:ln>
+                <a:noFill/>
+              </a:ln>
+            </p:spPr>
+            <p:style>
+              <a:lnRef idx="2">
+                <a:schemeClr val="accent1">
+                  <a:shade val="50000"/>
+                </a:schemeClr>
+              </a:lnRef>
+              <a:fillRef idx="1">
+                <a:schemeClr val="accent1"/>
+              </a:fillRef>
+              <a:effectRef idx="0">
+                <a:schemeClr val="accent1"/>
+              </a:effectRef>
+              <a:fontRef idx="minor">
+                <a:schemeClr val="lt1"/>
+              </a:fontRef>
+            </p:style>
+            <p:txBody>
+              <a:bodyPr rtlCol="0" anchor="ctr"/>
+              <a:lstStyle/>
+              <a:p>
+                <a:pPr algn="ctr"/>
+                <a:r>
+                  <a:rPr lang="en-CA" sz="1000" b="1" dirty="0">
+                    <a:solidFill>
+                      <a:schemeClr val="tx1"/>
+                    </a:solidFill>
+                  </a:rPr>
+                  <a:t>VNet – 10.1.0.0/16</a:t>
+                </a:r>
+              </a:p>
+            </p:txBody>
+          </p:sp>
+        </p:grpSp>
+        <p:sp>
+          <p:nvSpPr>
+            <p:cNvPr id="42" name="Rectangle 41">
+              <a:extLst>
+                <a:ext uri="{FF2B5EF4-FFF2-40B4-BE49-F238E27FC236}">
+                  <a16:creationId xmlns:a16="http://schemas.microsoft.com/office/drawing/2014/main" id="{D693822C-22D2-48C9-BE64-E642335EE3B6}"/>
+                </a:ext>
+              </a:extLst>
+            </p:cNvPr>
+            <p:cNvSpPr/>
+            <p:nvPr/>
+          </p:nvSpPr>
+          <p:spPr>
+            <a:xfrm>
+              <a:off x="1007344" y="1447914"/>
+              <a:ext cx="2393354" cy="1393945"/>
+            </a:xfrm>
+            <a:prstGeom prst="rect">
+              <a:avLst/>
+            </a:prstGeom>
+            <a:noFill/>
+            <a:ln>
+              <a:prstDash val="lgDash"/>
+            </a:ln>
+          </p:spPr>
+          <p:style>
+            <a:lnRef idx="2">
+              <a:schemeClr val="accent1">
+                <a:shade val="50000"/>
+              </a:schemeClr>
+            </a:lnRef>
+            <a:fillRef idx="1">
+              <a:schemeClr val="accent1"/>
+            </a:fillRef>
+            <a:effectRef idx="0">
+              <a:schemeClr val="accent1"/>
+            </a:effectRef>
+            <a:fontRef idx="minor">
+              <a:schemeClr val="lt1"/>
+            </a:fontRef>
+          </p:style>
+          <p:txBody>
+            <a:bodyPr rtlCol="0" anchor="ctr"/>
+            <a:lstStyle/>
+            <a:p>
+              <a:pPr algn="ctr"/>
+              <a:endParaRPr lang="en-CA"/>
+            </a:p>
+          </p:txBody>
+        </p:sp>
+        <p:sp>
+          <p:nvSpPr>
+            <p:cNvPr id="44" name="Rectangle 43">
+              <a:extLst>
+                <a:ext uri="{FF2B5EF4-FFF2-40B4-BE49-F238E27FC236}">
+                  <a16:creationId xmlns:a16="http://schemas.microsoft.com/office/drawing/2014/main" id="{D1A1861A-2174-42B1-9C6E-96D87343AD83}"/>
+                </a:ext>
+              </a:extLst>
+            </p:cNvPr>
+            <p:cNvSpPr/>
+            <p:nvPr/>
+          </p:nvSpPr>
+          <p:spPr>
+            <a:xfrm>
+              <a:off x="911037" y="1225621"/>
+              <a:ext cx="1354213" cy="281638"/>
+            </a:xfrm>
+            <a:prstGeom prst="rect">
+              <a:avLst/>
+            </a:prstGeom>
+            <a:noFill/>
+            <a:ln>
+              <a:noFill/>
+            </a:ln>
+          </p:spPr>
+          <p:style>
+            <a:lnRef idx="2">
+              <a:schemeClr val="accent1">
+                <a:shade val="50000"/>
+              </a:schemeClr>
+            </a:lnRef>
+            <a:fillRef idx="1">
+              <a:schemeClr val="accent1"/>
+            </a:fillRef>
+            <a:effectRef idx="0">
+              <a:schemeClr val="accent1"/>
+            </a:effectRef>
+            <a:fontRef idx="minor">
+              <a:schemeClr val="lt1"/>
+            </a:fontRef>
+          </p:style>
+          <p:txBody>
+            <a:bodyPr rtlCol="0" anchor="ctr"/>
+            <a:lstStyle/>
+            <a:p>
+              <a:pPr algn="ctr"/>
+              <a:r>
+                <a:rPr lang="en-CA" sz="1000" b="1" dirty="0">
+                  <a:solidFill>
+                    <a:schemeClr val="tx1"/>
+                  </a:solidFill>
+                </a:rPr>
+                <a:t>Subnet – 10.1.0.0/24</a:t>
+              </a:r>
+            </a:p>
+          </p:txBody>
+        </p:sp>
+        <p:sp>
+          <p:nvSpPr>
+            <p:cNvPr id="45" name="Rectangle 44">
+              <a:extLst>
+                <a:ext uri="{FF2B5EF4-FFF2-40B4-BE49-F238E27FC236}">
+                  <a16:creationId xmlns:a16="http://schemas.microsoft.com/office/drawing/2014/main" id="{18D59607-1773-41B6-BFF0-65E01AF751BE}"/>
+                </a:ext>
+              </a:extLst>
+            </p:cNvPr>
+            <p:cNvSpPr/>
+            <p:nvPr/>
+          </p:nvSpPr>
+          <p:spPr>
+            <a:xfrm>
+              <a:off x="1210345" y="687707"/>
+              <a:ext cx="1284517" cy="251870"/>
+            </a:xfrm>
+            <a:prstGeom prst="rect">
+              <a:avLst/>
+            </a:prstGeom>
+            <a:noFill/>
+            <a:ln>
+              <a:noFill/>
+            </a:ln>
+          </p:spPr>
+          <p:style>
+            <a:lnRef idx="2">
+              <a:schemeClr val="accent1">
+                <a:shade val="50000"/>
+              </a:schemeClr>
+            </a:lnRef>
+            <a:fillRef idx="1">
+              <a:schemeClr val="accent1"/>
+            </a:fillRef>
+            <a:effectRef idx="0">
+              <a:schemeClr val="accent1"/>
+            </a:effectRef>
+            <a:fontRef idx="minor">
+              <a:schemeClr val="lt1"/>
+            </a:fontRef>
+          </p:style>
+          <p:txBody>
+            <a:bodyPr rtlCol="0" anchor="ctr"/>
+            <a:lstStyle/>
+            <a:p>
+              <a:pPr algn="ctr"/>
+              <a:r>
+                <a:rPr lang="en-CA" sz="1000" b="1" dirty="0">
+                  <a:solidFill>
+                    <a:schemeClr val="tx1"/>
+                  </a:solidFill>
+                </a:rPr>
+                <a:t>Spoke VNet - App</a:t>
+              </a:r>
+            </a:p>
+          </p:txBody>
+        </p:sp>
+        <p:grpSp>
+          <p:nvGrpSpPr>
+            <p:cNvPr id="54" name="Group 53">
+              <a:extLst>
+                <a:ext uri="{FF2B5EF4-FFF2-40B4-BE49-F238E27FC236}">
+                  <a16:creationId xmlns:a16="http://schemas.microsoft.com/office/drawing/2014/main" id="{B4EB95AE-3C7F-4933-AC51-BF7EDA6FC0D9}"/>
+                </a:ext>
+              </a:extLst>
+            </p:cNvPr>
+            <p:cNvGrpSpPr/>
+            <p:nvPr/>
+          </p:nvGrpSpPr>
+          <p:grpSpPr>
+            <a:xfrm>
+              <a:off x="1735124" y="1849040"/>
+              <a:ext cx="937793" cy="651037"/>
+              <a:chOff x="1149983" y="3959196"/>
+              <a:chExt cx="937793" cy="651037"/>
+            </a:xfrm>
+          </p:grpSpPr>
+          <p:sp>
+            <p:nvSpPr>
+              <p:cNvPr id="48" name="Rectangle 47">
+                <a:extLst>
+                  <a:ext uri="{FF2B5EF4-FFF2-40B4-BE49-F238E27FC236}">
+                    <a16:creationId xmlns:a16="http://schemas.microsoft.com/office/drawing/2014/main" id="{EED20B61-EBC9-44CC-B723-F8BD9541867D}"/>
+                  </a:ext>
+                </a:extLst>
+              </p:cNvPr>
+              <p:cNvSpPr/>
+              <p:nvPr/>
+            </p:nvSpPr>
+            <p:spPr>
+              <a:xfrm>
+                <a:off x="1149983" y="4324482"/>
+                <a:ext cx="937793" cy="285751"/>
+              </a:xfrm>
+              <a:prstGeom prst="rect">
+                <a:avLst/>
+              </a:prstGeom>
+              <a:noFill/>
+              <a:ln>
+                <a:noFill/>
+              </a:ln>
+            </p:spPr>
+            <p:style>
+              <a:lnRef idx="2">
+                <a:schemeClr val="accent1">
+                  <a:shade val="50000"/>
+                </a:schemeClr>
+              </a:lnRef>
+              <a:fillRef idx="1">
+                <a:schemeClr val="accent1"/>
+              </a:fillRef>
+              <a:effectRef idx="0">
+                <a:schemeClr val="accent1"/>
+              </a:effectRef>
+              <a:fontRef idx="minor">
+                <a:schemeClr val="lt1"/>
+              </a:fontRef>
+            </p:style>
+            <p:txBody>
+              <a:bodyPr rtlCol="0" anchor="ctr"/>
+              <a:lstStyle/>
+              <a:p>
+                <a:pPr algn="ctr"/>
+                <a:r>
+                  <a:rPr lang="en-CA" sz="1000" b="1" dirty="0">
+                    <a:solidFill>
+                      <a:schemeClr val="tx1"/>
+                    </a:solidFill>
+                  </a:rPr>
+                  <a:t>VM</a:t>
+                </a:r>
+              </a:p>
+            </p:txBody>
+          </p:sp>
+          <p:pic>
+            <p:nvPicPr>
+              <p:cNvPr id="53" name="Picture 52" descr="Icon&#10;&#10;Description automatically generated">
+                <a:extLst>
+                  <a:ext uri="{FF2B5EF4-FFF2-40B4-BE49-F238E27FC236}">
+                    <a16:creationId xmlns:a16="http://schemas.microsoft.com/office/drawing/2014/main" id="{F61D06B5-326A-456E-A484-43FAD7644C3A}"/>
+                  </a:ext>
+                </a:extLst>
+              </p:cNvPr>
+              <p:cNvPicPr>
+                <a:picLocks noChangeAspect="1"/>
+              </p:cNvPicPr>
+              <p:nvPr/>
+            </p:nvPicPr>
+            <p:blipFill>
+              <a:blip r:embed="rId7">
+                <a:extLst>
+                  <a:ext uri="{28A0092B-C50C-407E-A947-70E740481C1C}">
+                    <a14:useLocalDpi xmlns:a14="http://schemas.microsoft.com/office/drawing/2010/main" val="0"/>
+                  </a:ext>
+                </a:extLst>
+              </a:blip>
+              <a:stretch>
+                <a:fillRect/>
+              </a:stretch>
+            </p:blipFill>
+            <p:spPr>
+              <a:xfrm>
+                <a:off x="1377242" y="3959196"/>
+                <a:ext cx="475361" cy="426617"/>
+              </a:xfrm>
+              <a:prstGeom prst="rect">
+                <a:avLst/>
+              </a:prstGeom>
+            </p:spPr>
+          </p:pic>
+        </p:grpSp>
+      </p:grpSp>
+      <p:sp>
+        <p:nvSpPr>
+          <p:cNvPr id="69" name="Rectangle 68">
+            <a:extLst>
+              <a:ext uri="{FF2B5EF4-FFF2-40B4-BE49-F238E27FC236}">
+                <a16:creationId xmlns:a16="http://schemas.microsoft.com/office/drawing/2014/main" id="{6DD445DF-FC43-40AE-8BD6-DF4B12FA220F}"/>
+              </a:ext>
+            </a:extLst>
+          </p:cNvPr>
+          <p:cNvSpPr/>
+          <p:nvPr/>
+        </p:nvSpPr>
+        <p:spPr>
+          <a:xfrm>
+            <a:off x="4268426" y="2670794"/>
+            <a:ext cx="937793" cy="285751"/>
+          </a:xfrm>
+          <a:prstGeom prst="rect">
+            <a:avLst/>
+          </a:prstGeom>
+          <a:noFill/>
+          <a:ln>
+            <a:noFill/>
+          </a:ln>
+        </p:spPr>
+        <p:style>
+          <a:lnRef idx="2">
+            <a:schemeClr val="accent1">
+              <a:shade val="50000"/>
+            </a:schemeClr>
+          </a:lnRef>
+          <a:fillRef idx="1">
+            <a:schemeClr val="accent1"/>
+          </a:fillRef>
+          <a:effectRef idx="0">
+            <a:schemeClr val="accent1"/>
+          </a:effectRef>
+          <a:fontRef idx="minor">
+            <a:schemeClr val="lt1"/>
+          </a:fontRef>
+        </p:style>
+        <p:txBody>
+          <a:bodyPr rtlCol="0" anchor="ctr"/>
+          <a:lstStyle/>
+          <a:p>
+            <a:pPr algn="ctr"/>
+            <a:r>
+              <a:rPr lang="en-CA" sz="1000" b="1" dirty="0">
+                <a:solidFill>
+                  <a:schemeClr val="tx1"/>
+                </a:solidFill>
+              </a:rPr>
+              <a:t>VNet Peering</a:t>
+            </a:r>
+          </a:p>
+        </p:txBody>
+      </p:sp>
+      <p:grpSp>
+        <p:nvGrpSpPr>
+          <p:cNvPr id="106" name="Group 105">
+            <a:extLst>
+              <a:ext uri="{FF2B5EF4-FFF2-40B4-BE49-F238E27FC236}">
+                <a16:creationId xmlns:a16="http://schemas.microsoft.com/office/drawing/2014/main" id="{0880D4C0-C78D-4185-9186-4958379480C5}"/>
+              </a:ext>
+            </a:extLst>
+          </p:cNvPr>
+          <p:cNvGrpSpPr/>
+          <p:nvPr/>
+        </p:nvGrpSpPr>
+        <p:grpSpPr>
+          <a:xfrm>
+            <a:off x="8886217" y="2502479"/>
+            <a:ext cx="970573" cy="790037"/>
+            <a:chOff x="10899931" y="2303928"/>
+            <a:chExt cx="970573" cy="790037"/>
+          </a:xfrm>
+        </p:grpSpPr>
+        <p:grpSp>
+          <p:nvGrpSpPr>
+            <p:cNvPr id="97" name="Group 96">
+              <a:extLst>
+                <a:ext uri="{FF2B5EF4-FFF2-40B4-BE49-F238E27FC236}">
+                  <a16:creationId xmlns:a16="http://schemas.microsoft.com/office/drawing/2014/main" id="{4B0187A5-DF82-4FB6-97C9-5E23CADCD612}"/>
+                </a:ext>
+              </a:extLst>
+            </p:cNvPr>
+            <p:cNvGrpSpPr/>
+            <p:nvPr/>
+          </p:nvGrpSpPr>
+          <p:grpSpPr>
+            <a:xfrm>
+              <a:off x="10899931" y="2303928"/>
+              <a:ext cx="942975" cy="666822"/>
+              <a:chOff x="5667375" y="2971728"/>
+              <a:chExt cx="942975" cy="666822"/>
+            </a:xfrm>
+          </p:grpSpPr>
+          <p:pic>
+            <p:nvPicPr>
+              <p:cNvPr id="98" name="Picture 97" descr="Logo&#10;&#10;Description automatically generated">
+                <a:extLst>
+                  <a:ext uri="{FF2B5EF4-FFF2-40B4-BE49-F238E27FC236}">
+                    <a16:creationId xmlns:a16="http://schemas.microsoft.com/office/drawing/2014/main" id="{8998DFAC-5274-4B35-AC2D-894BBCF5B0B3}"/>
+                  </a:ext>
+                </a:extLst>
+              </p:cNvPr>
+              <p:cNvPicPr>
+                <a:picLocks noChangeAspect="1"/>
+              </p:cNvPicPr>
+              <p:nvPr/>
+            </p:nvPicPr>
+            <p:blipFill>
+              <a:blip r:embed="rId8">
+                <a:extLst>
+                  <a:ext uri="{28A0092B-C50C-407E-A947-70E740481C1C}">
+                    <a14:useLocalDpi xmlns:a14="http://schemas.microsoft.com/office/drawing/2010/main" val="0"/>
+                  </a:ext>
+                </a:extLst>
+              </a:blip>
+              <a:stretch>
+                <a:fillRect/>
+              </a:stretch>
+            </p:blipFill>
+            <p:spPr>
+              <a:xfrm>
+                <a:off x="5910491" y="2971728"/>
+                <a:ext cx="448532" cy="448532"/>
+              </a:xfrm>
+              <a:prstGeom prst="rect">
+                <a:avLst/>
+              </a:prstGeom>
+            </p:spPr>
+          </p:pic>
+          <p:sp>
+            <p:nvSpPr>
+              <p:cNvPr id="99" name="Rectangle 98">
+                <a:extLst>
+                  <a:ext uri="{FF2B5EF4-FFF2-40B4-BE49-F238E27FC236}">
+                    <a16:creationId xmlns:a16="http://schemas.microsoft.com/office/drawing/2014/main" id="{4A8489A4-961F-46BC-9493-439FF67449A5}"/>
+                  </a:ext>
+                </a:extLst>
+              </p:cNvPr>
+              <p:cNvSpPr/>
+              <p:nvPr/>
+            </p:nvSpPr>
+            <p:spPr>
+              <a:xfrm>
+                <a:off x="5667375" y="3352799"/>
+                <a:ext cx="942975" cy="285751"/>
+              </a:xfrm>
+              <a:prstGeom prst="rect">
+                <a:avLst/>
+              </a:prstGeom>
+              <a:noFill/>
+              <a:ln>
+                <a:noFill/>
+              </a:ln>
+            </p:spPr>
+            <p:style>
+              <a:lnRef idx="2">
+                <a:schemeClr val="accent1">
+                  <a:shade val="50000"/>
+                </a:schemeClr>
+              </a:lnRef>
+              <a:fillRef idx="1">
+                <a:schemeClr val="accent1"/>
+              </a:fillRef>
+              <a:effectRef idx="0">
+                <a:schemeClr val="accent1"/>
+              </a:effectRef>
+              <a:fontRef idx="minor">
+                <a:schemeClr val="lt1"/>
+              </a:fontRef>
+            </p:style>
+            <p:txBody>
+              <a:bodyPr rtlCol="0" anchor="ctr"/>
+              <a:lstStyle/>
+              <a:p>
+                <a:pPr algn="ctr"/>
+                <a:r>
+                  <a:rPr lang="en-CA" sz="1000" b="1" dirty="0">
+                    <a:solidFill>
+                      <a:schemeClr val="tx1"/>
+                    </a:solidFill>
+                  </a:rPr>
+                  <a:t>Key Vault</a:t>
+                </a:r>
+              </a:p>
+            </p:txBody>
+          </p:sp>
+        </p:grpSp>
+        <p:sp>
+          <p:nvSpPr>
+            <p:cNvPr id="105" name="Rectangle 104">
+              <a:extLst>
+                <a:ext uri="{FF2B5EF4-FFF2-40B4-BE49-F238E27FC236}">
+                  <a16:creationId xmlns:a16="http://schemas.microsoft.com/office/drawing/2014/main" id="{103E7E3A-1A28-45EA-9BAD-D1344A213024}"/>
+                </a:ext>
+              </a:extLst>
+            </p:cNvPr>
+            <p:cNvSpPr/>
+            <p:nvPr/>
+          </p:nvSpPr>
+          <p:spPr>
+            <a:xfrm>
+              <a:off x="10932427" y="2847744"/>
+              <a:ext cx="938077" cy="246221"/>
+            </a:xfrm>
+            <a:prstGeom prst="rect">
+              <a:avLst/>
+            </a:prstGeom>
+          </p:spPr>
+          <p:txBody>
+            <a:bodyPr wrap="none">
+              <a:spAutoFit/>
+            </a:bodyPr>
+            <a:lstStyle/>
+            <a:p>
+              <a:r>
+                <a:rPr lang="en-CA" sz="1000" b="0" dirty="0">
+                  <a:effectLst/>
+                </a:rPr>
+                <a:t>20.38.149.196</a:t>
+              </a:r>
+            </a:p>
+          </p:txBody>
+        </p:sp>
+      </p:grpSp>
+      <p:sp>
+        <p:nvSpPr>
+          <p:cNvPr id="107" name="Rectangle 106">
+            <a:extLst>
+              <a:ext uri="{FF2B5EF4-FFF2-40B4-BE49-F238E27FC236}">
+                <a16:creationId xmlns:a16="http://schemas.microsoft.com/office/drawing/2014/main" id="{CCED0884-FA50-426B-B20F-3A1B2DE2F748}"/>
+              </a:ext>
+            </a:extLst>
+          </p:cNvPr>
+          <p:cNvSpPr/>
+          <p:nvPr/>
+        </p:nvSpPr>
+        <p:spPr>
+          <a:xfrm>
+            <a:off x="2126250" y="3254974"/>
+            <a:ext cx="609462" cy="246221"/>
+          </a:xfrm>
+          <a:prstGeom prst="rect">
+            <a:avLst/>
+          </a:prstGeom>
+        </p:spPr>
+        <p:txBody>
+          <a:bodyPr wrap="none">
+            <a:spAutoFit/>
+          </a:bodyPr>
+          <a:lstStyle/>
+          <a:p>
+            <a:r>
+              <a:rPr lang="en-CA" sz="1000" b="0" i="0" dirty="0">
+                <a:solidFill>
+                  <a:srgbClr val="000000"/>
+                </a:solidFill>
+                <a:effectLst/>
+              </a:rPr>
+              <a:t>10.1.0.4</a:t>
+            </a:r>
+            <a:endParaRPr lang="en-CA" sz="1000" dirty="0"/>
+          </a:p>
+        </p:txBody>
+      </p:sp>
+      <p:grpSp>
+        <p:nvGrpSpPr>
+          <p:cNvPr id="112" name="Group 111">
+            <a:extLst>
+              <a:ext uri="{FF2B5EF4-FFF2-40B4-BE49-F238E27FC236}">
+                <a16:creationId xmlns:a16="http://schemas.microsoft.com/office/drawing/2014/main" id="{448BDF5F-219E-49A1-8D8F-C20D53E32F64}"/>
+              </a:ext>
+            </a:extLst>
+          </p:cNvPr>
+          <p:cNvGrpSpPr/>
+          <p:nvPr/>
+        </p:nvGrpSpPr>
+        <p:grpSpPr>
+          <a:xfrm>
+            <a:off x="1614432" y="3127375"/>
+            <a:ext cx="681499" cy="482543"/>
+            <a:chOff x="7958860" y="5899341"/>
+            <a:chExt cx="681499" cy="482543"/>
+          </a:xfrm>
+        </p:grpSpPr>
+        <p:pic>
+          <p:nvPicPr>
+            <p:cNvPr id="113" name="Graphic 112">
+              <a:extLst>
+                <a:ext uri="{FF2B5EF4-FFF2-40B4-BE49-F238E27FC236}">
+                  <a16:creationId xmlns:a16="http://schemas.microsoft.com/office/drawing/2014/main" id="{AE201023-78EE-4F3E-BC06-A5B889668760}"/>
+                </a:ext>
+              </a:extLst>
+            </p:cNvPr>
+            <p:cNvPicPr>
+              <a:picLocks noChangeAspect="1"/>
+            </p:cNvPicPr>
+            <p:nvPr/>
+          </p:nvPicPr>
+          <p:blipFill>
+            <a:blip r:embed="rId9">
+              <a:extLst>
+                <a:ext uri="{28A0092B-C50C-407E-A947-70E740481C1C}">
+                  <a14:useLocalDpi xmlns:a14="http://schemas.microsoft.com/office/drawing/2010/main" val="0"/>
+                </a:ext>
+                <a:ext uri="{96DAC541-7B7A-43D3-8B79-37D633B846F1}">
+                  <asvg:svgBlip xmlns:asvg="http://schemas.microsoft.com/office/drawing/2016/SVG/main" r:embed="rId10"/>
+                </a:ext>
+              </a:extLst>
+            </a:blip>
+            <a:stretch>
+              <a:fillRect/>
+            </a:stretch>
+          </p:blipFill>
+          <p:spPr>
+            <a:xfrm>
+              <a:off x="8158490" y="5899341"/>
+              <a:ext cx="282237" cy="317140"/>
+            </a:xfrm>
+            <a:prstGeom prst="rect">
+              <a:avLst/>
+            </a:prstGeom>
+          </p:spPr>
+        </p:pic>
+        <p:sp>
+          <p:nvSpPr>
+            <p:cNvPr id="114" name="Rectangle 113">
+              <a:extLst>
+                <a:ext uri="{FF2B5EF4-FFF2-40B4-BE49-F238E27FC236}">
+                  <a16:creationId xmlns:a16="http://schemas.microsoft.com/office/drawing/2014/main" id="{DAA7BFED-AF4E-40DF-9223-A066A98A8BEB}"/>
+                </a:ext>
+              </a:extLst>
+            </p:cNvPr>
+            <p:cNvSpPr/>
+            <p:nvPr/>
+          </p:nvSpPr>
+          <p:spPr>
+            <a:xfrm>
+              <a:off x="7958860" y="6149829"/>
+              <a:ext cx="681499" cy="232055"/>
+            </a:xfrm>
+            <a:prstGeom prst="rect">
+              <a:avLst/>
+            </a:prstGeom>
+            <a:noFill/>
+            <a:ln>
+              <a:noFill/>
+            </a:ln>
+          </p:spPr>
+          <p:style>
+            <a:lnRef idx="2">
+              <a:schemeClr val="accent1">
+                <a:shade val="50000"/>
+              </a:schemeClr>
+            </a:lnRef>
+            <a:fillRef idx="1">
+              <a:schemeClr val="accent1"/>
+            </a:fillRef>
+            <a:effectRef idx="0">
+              <a:schemeClr val="accent1"/>
+            </a:effectRef>
+            <a:fontRef idx="minor">
+              <a:schemeClr val="lt1"/>
+            </a:fontRef>
+          </p:style>
+          <p:txBody>
+            <a:bodyPr rtlCol="0" anchor="ctr"/>
+            <a:lstStyle/>
+            <a:p>
+              <a:pPr algn="ctr"/>
+              <a:r>
+                <a:rPr lang="en-CA" sz="1000" b="1" dirty="0">
+                  <a:solidFill>
+                    <a:schemeClr val="tx1"/>
+                  </a:solidFill>
+                </a:rPr>
+                <a:t>NIC</a:t>
+              </a:r>
+            </a:p>
+          </p:txBody>
+        </p:sp>
+      </p:grpSp>
+      <p:sp>
+        <p:nvSpPr>
+          <p:cNvPr id="70" name="Rectangle 69">
+            <a:extLst>
+              <a:ext uri="{FF2B5EF4-FFF2-40B4-BE49-F238E27FC236}">
+                <a16:creationId xmlns:a16="http://schemas.microsoft.com/office/drawing/2014/main" id="{275C8101-D293-4BB2-B252-666979EE9455}"/>
+              </a:ext>
+            </a:extLst>
+          </p:cNvPr>
+          <p:cNvSpPr/>
+          <p:nvPr/>
+        </p:nvSpPr>
+        <p:spPr>
+          <a:xfrm>
+            <a:off x="6541023" y="3292516"/>
+            <a:ext cx="609462" cy="246221"/>
+          </a:xfrm>
+          <a:prstGeom prst="rect">
+            <a:avLst/>
+          </a:prstGeom>
+        </p:spPr>
+        <p:txBody>
+          <a:bodyPr wrap="none">
+            <a:spAutoFit/>
+          </a:bodyPr>
+          <a:lstStyle/>
+          <a:p>
+            <a:r>
+              <a:rPr lang="en-CA" sz="1000" b="0" i="0" dirty="0">
+                <a:solidFill>
+                  <a:srgbClr val="000000"/>
+                </a:solidFill>
+                <a:effectLst/>
+              </a:rPr>
+              <a:t>10.0.0.4</a:t>
+            </a:r>
+            <a:endParaRPr lang="en-CA" sz="1000" dirty="0"/>
+          </a:p>
+        </p:txBody>
+      </p:sp>
+      <p:sp>
+        <p:nvSpPr>
+          <p:cNvPr id="73" name="Rectangle 72">
+            <a:extLst>
+              <a:ext uri="{FF2B5EF4-FFF2-40B4-BE49-F238E27FC236}">
+                <a16:creationId xmlns:a16="http://schemas.microsoft.com/office/drawing/2014/main" id="{7F173918-3754-4253-97E4-8535D404FDC9}"/>
+              </a:ext>
+            </a:extLst>
+          </p:cNvPr>
+          <p:cNvSpPr/>
+          <p:nvPr/>
+        </p:nvSpPr>
+        <p:spPr>
+          <a:xfrm>
+            <a:off x="2126309" y="3256323"/>
+            <a:ext cx="609462" cy="246221"/>
+          </a:xfrm>
+          <a:prstGeom prst="rect">
+            <a:avLst/>
+          </a:prstGeom>
+        </p:spPr>
+        <p:txBody>
+          <a:bodyPr wrap="none">
+            <a:spAutoFit/>
+          </a:bodyPr>
+          <a:lstStyle/>
+          <a:p>
+            <a:r>
+              <a:rPr lang="en-CA" sz="1000" b="0" i="0" dirty="0">
+                <a:solidFill>
+                  <a:srgbClr val="000000"/>
+                </a:solidFill>
+                <a:effectLst/>
+              </a:rPr>
+              <a:t>10.1.0.4</a:t>
+            </a:r>
+            <a:endParaRPr lang="en-CA" sz="1000" dirty="0"/>
+          </a:p>
+        </p:txBody>
+      </p:sp>
+      <p:sp>
+        <p:nvSpPr>
+          <p:cNvPr id="103" name="Rectangle 102">
+            <a:extLst>
+              <a:ext uri="{FF2B5EF4-FFF2-40B4-BE49-F238E27FC236}">
+                <a16:creationId xmlns:a16="http://schemas.microsoft.com/office/drawing/2014/main" id="{5D1E4941-71E8-48F3-B4F8-C84CD58A0669}"/>
+              </a:ext>
+            </a:extLst>
+          </p:cNvPr>
+          <p:cNvSpPr/>
+          <p:nvPr/>
+        </p:nvSpPr>
+        <p:spPr>
+          <a:xfrm>
+            <a:off x="6739804" y="2055675"/>
+            <a:ext cx="1282723" cy="246221"/>
+          </a:xfrm>
+          <a:prstGeom prst="rect">
+            <a:avLst/>
+          </a:prstGeom>
+        </p:spPr>
+        <p:txBody>
+          <a:bodyPr wrap="none">
+            <a:spAutoFit/>
+          </a:bodyPr>
+          <a:lstStyle/>
+          <a:p>
+            <a:r>
+              <a:rPr lang="en-CA" sz="1000" b="1" dirty="0">
+                <a:solidFill>
+                  <a:schemeClr val="accent1"/>
+                </a:solidFill>
+              </a:rPr>
+              <a:t>AzureFirewallSubnet</a:t>
+            </a:r>
+          </a:p>
+        </p:txBody>
+      </p:sp>
+      <p:sp>
+        <p:nvSpPr>
+          <p:cNvPr id="47" name="Rectangle 46">
+            <a:extLst>
+              <a:ext uri="{FF2B5EF4-FFF2-40B4-BE49-F238E27FC236}">
+                <a16:creationId xmlns:a16="http://schemas.microsoft.com/office/drawing/2014/main" id="{79908241-A5BC-4A84-BD93-D99FC066F7DF}"/>
+              </a:ext>
+            </a:extLst>
+          </p:cNvPr>
+          <p:cNvSpPr/>
+          <p:nvPr/>
+        </p:nvSpPr>
+        <p:spPr>
+          <a:xfrm>
+            <a:off x="2014166" y="589750"/>
+            <a:ext cx="6672771" cy="678023"/>
+          </a:xfrm>
+          <a:prstGeom prst="rect">
+            <a:avLst/>
+          </a:prstGeom>
+          <a:noFill/>
+          <a:ln>
+            <a:noFill/>
+          </a:ln>
+        </p:spPr>
+        <p:style>
+          <a:lnRef idx="2">
+            <a:schemeClr val="accent1">
+              <a:shade val="50000"/>
+            </a:schemeClr>
+          </a:lnRef>
+          <a:fillRef idx="1">
+            <a:schemeClr val="accent1"/>
+          </a:fillRef>
+          <a:effectRef idx="0">
+            <a:schemeClr val="accent1"/>
+          </a:effectRef>
+          <a:fontRef idx="minor">
+            <a:schemeClr val="lt1"/>
+          </a:fontRef>
+        </p:style>
+        <p:txBody>
+          <a:bodyPr rtlCol="0" anchor="ctr"/>
+          <a:lstStyle/>
+          <a:p>
+            <a:pPr algn="ctr"/>
+            <a:r>
+              <a:rPr lang="en-CA" sz="1600" b="1" u="sng" dirty="0">
+                <a:solidFill>
+                  <a:schemeClr val="tx1"/>
+                </a:solidFill>
+              </a:rPr>
+              <a:t>Azure Network – Firewall &amp; Service Endpoint</a:t>
+            </a:r>
+          </a:p>
+        </p:txBody>
+      </p:sp>
+      <p:grpSp>
+        <p:nvGrpSpPr>
+          <p:cNvPr id="50" name="Group 49">
+            <a:extLst>
+              <a:ext uri="{FF2B5EF4-FFF2-40B4-BE49-F238E27FC236}">
+                <a16:creationId xmlns:a16="http://schemas.microsoft.com/office/drawing/2014/main" id="{32A4D9F3-9DBA-4F60-8591-5AD9A6187091}"/>
+              </a:ext>
+            </a:extLst>
+          </p:cNvPr>
+          <p:cNvGrpSpPr/>
+          <p:nvPr/>
+        </p:nvGrpSpPr>
+        <p:grpSpPr>
+          <a:xfrm>
+            <a:off x="2939828" y="1817104"/>
+            <a:ext cx="1126704" cy="853084"/>
+            <a:chOff x="465703" y="4521412"/>
+            <a:chExt cx="1126704" cy="853084"/>
+          </a:xfrm>
+        </p:grpSpPr>
+        <p:sp>
+          <p:nvSpPr>
+            <p:cNvPr id="57" name="Rectangle 56">
+              <a:extLst>
+                <a:ext uri="{FF2B5EF4-FFF2-40B4-BE49-F238E27FC236}">
+                  <a16:creationId xmlns:a16="http://schemas.microsoft.com/office/drawing/2014/main" id="{8806AC6E-1D06-42E0-9526-8E0C9424E94A}"/>
+                </a:ext>
+              </a:extLst>
+            </p:cNvPr>
+            <p:cNvSpPr/>
+            <p:nvPr/>
+          </p:nvSpPr>
+          <p:spPr>
+            <a:xfrm>
+              <a:off x="465703" y="5080318"/>
+              <a:ext cx="890667" cy="294178"/>
+            </a:xfrm>
+            <a:prstGeom prst="rect">
+              <a:avLst/>
+            </a:prstGeom>
+            <a:noFill/>
+            <a:ln>
+              <a:noFill/>
+            </a:ln>
+          </p:spPr>
+          <p:style>
+            <a:lnRef idx="2">
+              <a:schemeClr val="accent1">
+                <a:shade val="50000"/>
+              </a:schemeClr>
+            </a:lnRef>
+            <a:fillRef idx="1">
+              <a:schemeClr val="accent1"/>
+            </a:fillRef>
+            <a:effectRef idx="0">
+              <a:schemeClr val="accent1"/>
+            </a:effectRef>
+            <a:fontRef idx="minor">
+              <a:schemeClr val="lt1"/>
+            </a:fontRef>
+          </p:style>
+          <p:txBody>
+            <a:bodyPr rtlCol="0" anchor="ctr"/>
+            <a:lstStyle/>
+            <a:p>
+              <a:pPr algn="ctr"/>
+              <a:r>
+                <a:rPr lang="en-CA" sz="1000" b="1" dirty="0">
+                  <a:solidFill>
+                    <a:schemeClr val="tx1"/>
+                  </a:solidFill>
+                </a:rPr>
+                <a:t>Route Table</a:t>
+              </a:r>
+            </a:p>
+          </p:txBody>
+        </p:sp>
+        <p:pic>
+          <p:nvPicPr>
+            <p:cNvPr id="58" name="Graphic 57">
+              <a:extLst>
+                <a:ext uri="{FF2B5EF4-FFF2-40B4-BE49-F238E27FC236}">
+                  <a16:creationId xmlns:a16="http://schemas.microsoft.com/office/drawing/2014/main" id="{892BB7D5-F9E0-4E7A-9960-C88E5F752B75}"/>
+                </a:ext>
+              </a:extLst>
+            </p:cNvPr>
+            <p:cNvPicPr>
+              <a:picLocks noChangeAspect="1"/>
+            </p:cNvPicPr>
+            <p:nvPr/>
+          </p:nvPicPr>
+          <p:blipFill>
+            <a:blip r:embed="rId11">
+              <a:extLst>
+                <a:ext uri="{28A0092B-C50C-407E-A947-70E740481C1C}">
+                  <a14:useLocalDpi xmlns:a14="http://schemas.microsoft.com/office/drawing/2010/main" val="0"/>
+                </a:ext>
+                <a:ext uri="{96DAC541-7B7A-43D3-8B79-37D633B846F1}">
+                  <asvg:svgBlip xmlns:asvg="http://schemas.microsoft.com/office/drawing/2016/SVG/main" r:embed="rId12"/>
+                </a:ext>
+              </a:extLst>
+            </a:blip>
+            <a:stretch>
+              <a:fillRect/>
+            </a:stretch>
+          </p:blipFill>
+          <p:spPr>
+            <a:xfrm>
+              <a:off x="612052" y="4783968"/>
+              <a:ext cx="404474" cy="404474"/>
+            </a:xfrm>
+            <a:prstGeom prst="rect">
+              <a:avLst/>
+            </a:prstGeom>
+          </p:spPr>
+        </p:pic>
+        <p:pic>
+          <p:nvPicPr>
+            <p:cNvPr id="59" name="Graphic 58">
+              <a:extLst>
+                <a:ext uri="{FF2B5EF4-FFF2-40B4-BE49-F238E27FC236}">
+                  <a16:creationId xmlns:a16="http://schemas.microsoft.com/office/drawing/2014/main" id="{C7F217D7-0074-4C1E-AA79-118699E34BC3}"/>
+                </a:ext>
+              </a:extLst>
+            </p:cNvPr>
+            <p:cNvPicPr>
+              <a:picLocks noChangeAspect="1"/>
+            </p:cNvPicPr>
+            <p:nvPr/>
+          </p:nvPicPr>
+          <p:blipFill>
+            <a:blip r:embed="rId13">
+              <a:extLst>
+                <a:ext uri="{28A0092B-C50C-407E-A947-70E740481C1C}">
+                  <a14:useLocalDpi xmlns:a14="http://schemas.microsoft.com/office/drawing/2010/main" val="0"/>
+                </a:ext>
+                <a:ext uri="{96DAC541-7B7A-43D3-8B79-37D633B846F1}">
+                  <asvg:svgBlip xmlns:asvg="http://schemas.microsoft.com/office/drawing/2016/SVG/main" r:embed="rId14"/>
+                </a:ext>
+              </a:extLst>
+            </a:blip>
+            <a:stretch>
+              <a:fillRect/>
+            </a:stretch>
+          </p:blipFill>
+          <p:spPr>
+            <a:xfrm>
+              <a:off x="903438" y="4671903"/>
+              <a:ext cx="476250" cy="476250"/>
+            </a:xfrm>
+            <a:prstGeom prst="rect">
+              <a:avLst/>
+            </a:prstGeom>
+          </p:spPr>
+        </p:pic>
+        <p:sp>
+          <p:nvSpPr>
+            <p:cNvPr id="60" name="Rectangle 59">
+              <a:extLst>
+                <a:ext uri="{FF2B5EF4-FFF2-40B4-BE49-F238E27FC236}">
+                  <a16:creationId xmlns:a16="http://schemas.microsoft.com/office/drawing/2014/main" id="{F10B4EF0-E875-4B58-9AAA-ECB5DA52C988}"/>
+                </a:ext>
+              </a:extLst>
+            </p:cNvPr>
+            <p:cNvSpPr/>
+            <p:nvPr/>
+          </p:nvSpPr>
+          <p:spPr>
+            <a:xfrm>
+              <a:off x="701740" y="4521412"/>
+              <a:ext cx="890667" cy="294178"/>
+            </a:xfrm>
+            <a:prstGeom prst="rect">
+              <a:avLst/>
+            </a:prstGeom>
+            <a:noFill/>
+            <a:ln>
+              <a:noFill/>
+            </a:ln>
+          </p:spPr>
+          <p:style>
+            <a:lnRef idx="2">
+              <a:schemeClr val="accent1">
+                <a:shade val="50000"/>
+              </a:schemeClr>
+            </a:lnRef>
+            <a:fillRef idx="1">
+              <a:schemeClr val="accent1"/>
+            </a:fillRef>
+            <a:effectRef idx="0">
+              <a:schemeClr val="accent1"/>
+            </a:effectRef>
+            <a:fontRef idx="minor">
+              <a:schemeClr val="lt1"/>
+            </a:fontRef>
+          </p:style>
+          <p:txBody>
+            <a:bodyPr rtlCol="0" anchor="ctr"/>
+            <a:lstStyle/>
+            <a:p>
+              <a:pPr algn="ctr"/>
+              <a:r>
+                <a:rPr lang="en-CA" sz="1000" b="1" dirty="0">
+                  <a:solidFill>
+                    <a:schemeClr val="tx1"/>
+                  </a:solidFill>
+                </a:rPr>
+                <a:t>Route Filters</a:t>
+              </a:r>
+            </a:p>
+          </p:txBody>
+        </p:sp>
+      </p:grpSp>
+      <p:cxnSp>
+        <p:nvCxnSpPr>
+          <p:cNvPr id="5" name="Straight Arrow Connector 4">
+            <a:extLst>
+              <a:ext uri="{FF2B5EF4-FFF2-40B4-BE49-F238E27FC236}">
+                <a16:creationId xmlns:a16="http://schemas.microsoft.com/office/drawing/2014/main" id="{9A18C5F1-5D93-455A-ABB5-8B6CC5339AD5}"/>
+              </a:ext>
+            </a:extLst>
+          </p:cNvPr>
+          <p:cNvCxnSpPr>
+            <a:stCxn id="40" idx="3"/>
+          </p:cNvCxnSpPr>
+          <p:nvPr/>
+        </p:nvCxnSpPr>
+        <p:spPr>
+          <a:xfrm>
+            <a:off x="3883131" y="2892991"/>
+            <a:ext cx="1665181" cy="10370"/>
+          </a:xfrm>
+          <a:prstGeom prst="straightConnector1">
+            <a:avLst/>
+          </a:prstGeom>
+          <a:ln>
+            <a:solidFill>
+              <a:schemeClr val="tx1"/>
+            </a:solidFill>
+            <a:headEnd type="triangle"/>
+            <a:tailEnd type="triangle"/>
+          </a:ln>
+        </p:spPr>
+        <p:style>
+          <a:lnRef idx="1">
+            <a:schemeClr val="accent1"/>
+          </a:lnRef>
+          <a:fillRef idx="0">
+            <a:schemeClr val="accent1"/>
+          </a:fillRef>
+          <a:effectRef idx="0">
+            <a:schemeClr val="accent1"/>
+          </a:effectRef>
+          <a:fontRef idx="minor">
+            <a:schemeClr val="tx1"/>
+          </a:fontRef>
+        </p:style>
+      </p:cxnSp>
+      <p:grpSp>
+        <p:nvGrpSpPr>
+          <p:cNvPr id="61" name="Group 60">
+            <a:extLst>
+              <a:ext uri="{FF2B5EF4-FFF2-40B4-BE49-F238E27FC236}">
+                <a16:creationId xmlns:a16="http://schemas.microsoft.com/office/drawing/2014/main" id="{DED62330-366D-4BB1-8555-05BD10D54700}"/>
+              </a:ext>
+            </a:extLst>
+          </p:cNvPr>
+          <p:cNvGrpSpPr/>
+          <p:nvPr/>
+        </p:nvGrpSpPr>
+        <p:grpSpPr>
+          <a:xfrm>
+            <a:off x="3280085" y="3413126"/>
+            <a:ext cx="559659" cy="519942"/>
+            <a:chOff x="1801668" y="6194481"/>
+            <a:chExt cx="559659" cy="519942"/>
+          </a:xfrm>
+        </p:grpSpPr>
+        <p:pic>
+          <p:nvPicPr>
+            <p:cNvPr id="62" name="Graphic 61">
+              <a:extLst>
+                <a:ext uri="{FF2B5EF4-FFF2-40B4-BE49-F238E27FC236}">
+                  <a16:creationId xmlns:a16="http://schemas.microsoft.com/office/drawing/2014/main" id="{7FF68A51-68DE-4EA2-9366-F7DF25FB1E05}"/>
+                </a:ext>
+              </a:extLst>
+            </p:cNvPr>
+            <p:cNvPicPr>
+              <a:picLocks noChangeAspect="1"/>
+            </p:cNvPicPr>
+            <p:nvPr/>
+          </p:nvPicPr>
+          <p:blipFill>
+            <a:blip r:embed="rId15">
+              <a:extLst>
+                <a:ext uri="{28A0092B-C50C-407E-A947-70E740481C1C}">
+                  <a14:useLocalDpi xmlns:a14="http://schemas.microsoft.com/office/drawing/2010/main" val="0"/>
+                </a:ext>
+                <a:ext uri="{96DAC541-7B7A-43D3-8B79-37D633B846F1}">
+                  <asvg:svgBlip xmlns:asvg="http://schemas.microsoft.com/office/drawing/2016/SVG/main" r:embed="rId16"/>
+                </a:ext>
+              </a:extLst>
+            </a:blip>
+            <a:stretch>
+              <a:fillRect/>
+            </a:stretch>
+          </p:blipFill>
+          <p:spPr>
+            <a:xfrm>
+              <a:off x="1898316" y="6194481"/>
+              <a:ext cx="327165" cy="327165"/>
+            </a:xfrm>
+            <a:prstGeom prst="rect">
+              <a:avLst/>
+            </a:prstGeom>
+          </p:spPr>
+        </p:pic>
+        <p:sp>
+          <p:nvSpPr>
+            <p:cNvPr id="63" name="Rectangle 62">
+              <a:extLst>
+                <a:ext uri="{FF2B5EF4-FFF2-40B4-BE49-F238E27FC236}">
+                  <a16:creationId xmlns:a16="http://schemas.microsoft.com/office/drawing/2014/main" id="{1E0475ED-AEB3-4474-982C-30B64B3C9897}"/>
+                </a:ext>
+              </a:extLst>
+            </p:cNvPr>
+            <p:cNvSpPr/>
+            <p:nvPr/>
+          </p:nvSpPr>
+          <p:spPr>
+            <a:xfrm>
+              <a:off x="1801668" y="6468202"/>
+              <a:ext cx="559659" cy="246221"/>
+            </a:xfrm>
+            <a:prstGeom prst="rect">
+              <a:avLst/>
+            </a:prstGeom>
+            <a:noFill/>
+            <a:ln>
+              <a:noFill/>
+            </a:ln>
+          </p:spPr>
+          <p:style>
+            <a:lnRef idx="2">
+              <a:schemeClr val="accent1">
+                <a:shade val="50000"/>
+              </a:schemeClr>
+            </a:lnRef>
+            <a:fillRef idx="1">
+              <a:schemeClr val="accent1"/>
+            </a:fillRef>
+            <a:effectRef idx="0">
+              <a:schemeClr val="accent1"/>
+            </a:effectRef>
+            <a:fontRef idx="minor">
+              <a:schemeClr val="lt1"/>
+            </a:fontRef>
+          </p:style>
+          <p:txBody>
+            <a:bodyPr rtlCol="0" anchor="ctr"/>
+            <a:lstStyle/>
+            <a:p>
+              <a:pPr algn="ctr"/>
+              <a:r>
+                <a:rPr lang="en-CA" sz="1000" b="1" dirty="0">
+                  <a:solidFill>
+                    <a:schemeClr val="tx1"/>
+                  </a:solidFill>
+                </a:rPr>
+                <a:t>NSG</a:t>
+              </a:r>
+            </a:p>
+          </p:txBody>
+        </p:sp>
+      </p:grpSp>
+      <p:grpSp>
+        <p:nvGrpSpPr>
+          <p:cNvPr id="64" name="Group 63">
+            <a:extLst>
+              <a:ext uri="{FF2B5EF4-FFF2-40B4-BE49-F238E27FC236}">
+                <a16:creationId xmlns:a16="http://schemas.microsoft.com/office/drawing/2014/main" id="{4BAE8FD3-7DBD-4727-A800-B21382CA987E}"/>
+              </a:ext>
+            </a:extLst>
+          </p:cNvPr>
+          <p:cNvGrpSpPr/>
+          <p:nvPr/>
+        </p:nvGrpSpPr>
+        <p:grpSpPr>
+          <a:xfrm>
+            <a:off x="1754900" y="3444515"/>
+            <a:ext cx="1652287" cy="467441"/>
+            <a:chOff x="335276" y="6100300"/>
+            <a:chExt cx="1652287" cy="467441"/>
+          </a:xfrm>
+        </p:grpSpPr>
+        <p:sp>
+          <p:nvSpPr>
+            <p:cNvPr id="65" name="Rectangle 64">
+              <a:extLst>
+                <a:ext uri="{FF2B5EF4-FFF2-40B4-BE49-F238E27FC236}">
+                  <a16:creationId xmlns:a16="http://schemas.microsoft.com/office/drawing/2014/main" id="{F575ED95-E502-454F-88DE-9E023EF06E95}"/>
+                </a:ext>
+              </a:extLst>
+            </p:cNvPr>
+            <p:cNvSpPr/>
+            <p:nvPr/>
+          </p:nvSpPr>
+          <p:spPr>
+            <a:xfrm>
+              <a:off x="335276" y="6112500"/>
+              <a:ext cx="1652287" cy="455241"/>
+            </a:xfrm>
+            <a:prstGeom prst="rect">
+              <a:avLst/>
+            </a:prstGeom>
+            <a:noFill/>
+            <a:ln>
+              <a:noFill/>
+            </a:ln>
+          </p:spPr>
+          <p:style>
+            <a:lnRef idx="2">
+              <a:schemeClr val="accent1">
+                <a:shade val="50000"/>
+              </a:schemeClr>
+            </a:lnRef>
+            <a:fillRef idx="1">
+              <a:schemeClr val="accent1"/>
+            </a:fillRef>
+            <a:effectRef idx="0">
+              <a:schemeClr val="accent1"/>
+            </a:effectRef>
+            <a:fontRef idx="minor">
+              <a:schemeClr val="lt1"/>
+            </a:fontRef>
+          </p:style>
+          <p:txBody>
+            <a:bodyPr rtlCol="0" anchor="ctr"/>
+            <a:lstStyle/>
+            <a:p>
+              <a:r>
+                <a:rPr lang="en-CA" sz="800" dirty="0">
+                  <a:solidFill>
+                    <a:schemeClr val="tx1"/>
+                  </a:solidFill>
+                </a:rPr>
+                <a:t>1. Outbound key vault allowed</a:t>
+              </a:r>
+            </a:p>
+            <a:p>
+              <a:r>
+                <a:rPr lang="en-CA" sz="800" dirty="0">
+                  <a:solidFill>
+                    <a:schemeClr val="tx1"/>
+                  </a:solidFill>
+                </a:rPr>
+                <a:t>2. Outbound internet  denied</a:t>
+              </a:r>
+            </a:p>
+          </p:txBody>
+        </p:sp>
+        <p:sp>
+          <p:nvSpPr>
+            <p:cNvPr id="66" name="Multiplication Sign 65">
+              <a:extLst>
+                <a:ext uri="{FF2B5EF4-FFF2-40B4-BE49-F238E27FC236}">
+                  <a16:creationId xmlns:a16="http://schemas.microsoft.com/office/drawing/2014/main" id="{23C382AE-2184-48EC-B9AA-994EF8D8AE61}"/>
+                </a:ext>
+              </a:extLst>
+            </p:cNvPr>
+            <p:cNvSpPr/>
+            <p:nvPr/>
+          </p:nvSpPr>
+          <p:spPr>
+            <a:xfrm>
+              <a:off x="1666002" y="6262836"/>
+              <a:ext cx="225354" cy="285752"/>
+            </a:xfrm>
+            <a:prstGeom prst="mathMultiply">
+              <a:avLst/>
+            </a:prstGeom>
+            <a:solidFill>
+              <a:srgbClr val="FF0000"/>
+            </a:solidFill>
+          </p:spPr>
+          <p:style>
+            <a:lnRef idx="2">
+              <a:schemeClr val="accent1">
+                <a:shade val="50000"/>
+              </a:schemeClr>
+            </a:lnRef>
+            <a:fillRef idx="1">
+              <a:schemeClr val="accent1"/>
+            </a:fillRef>
+            <a:effectRef idx="0">
+              <a:schemeClr val="accent1"/>
+            </a:effectRef>
+            <a:fontRef idx="minor">
+              <a:schemeClr val="lt1"/>
+            </a:fontRef>
+          </p:style>
+          <p:txBody>
+            <a:bodyPr rtlCol="0" anchor="ctr"/>
+            <a:lstStyle/>
+            <a:p>
+              <a:pPr algn="ctr"/>
+              <a:endParaRPr lang="en-CA"/>
+            </a:p>
+          </p:txBody>
+        </p:sp>
+        <p:pic>
+          <p:nvPicPr>
+            <p:cNvPr id="67" name="Graphic 66" descr="Checkmark">
+              <a:extLst>
+                <a:ext uri="{FF2B5EF4-FFF2-40B4-BE49-F238E27FC236}">
+                  <a16:creationId xmlns:a16="http://schemas.microsoft.com/office/drawing/2014/main" id="{391715CB-ED86-43F3-AFAC-68A822E36AF1}"/>
+                </a:ext>
+              </a:extLst>
+            </p:cNvPr>
+            <p:cNvPicPr>
+              <a:picLocks noChangeAspect="1"/>
+            </p:cNvPicPr>
+            <p:nvPr/>
+          </p:nvPicPr>
+          <p:blipFill>
+            <a:blip r:embed="rId17">
+              <a:extLst>
+                <a:ext uri="{28A0092B-C50C-407E-A947-70E740481C1C}">
+                  <a14:useLocalDpi xmlns:a14="http://schemas.microsoft.com/office/drawing/2010/main" val="0"/>
+                </a:ext>
+                <a:ext uri="{96DAC541-7B7A-43D3-8B79-37D633B846F1}">
+                  <asvg:svgBlip xmlns:asvg="http://schemas.microsoft.com/office/drawing/2016/SVG/main" r:embed="rId18"/>
+                </a:ext>
+              </a:extLst>
+            </a:blip>
+            <a:stretch>
+              <a:fillRect/>
+            </a:stretch>
+          </p:blipFill>
+          <p:spPr>
+            <a:xfrm>
+              <a:off x="1695664" y="6100300"/>
+              <a:ext cx="253470" cy="253470"/>
+            </a:xfrm>
+            <a:prstGeom prst="rect">
+              <a:avLst/>
+            </a:prstGeom>
+          </p:spPr>
+        </p:pic>
+      </p:grpSp>
+      <p:cxnSp>
+        <p:nvCxnSpPr>
+          <p:cNvPr id="9" name="Connector: Curved 8">
+            <a:extLst>
+              <a:ext uri="{FF2B5EF4-FFF2-40B4-BE49-F238E27FC236}">
+                <a16:creationId xmlns:a16="http://schemas.microsoft.com/office/drawing/2014/main" id="{FCBDFBCC-DBAF-492B-A6F1-272D47F7E3E9}"/>
+              </a:ext>
+            </a:extLst>
+          </p:cNvPr>
+          <p:cNvCxnSpPr>
+            <a:cxnSpLocks/>
+            <a:stCxn id="53" idx="3"/>
+          </p:cNvCxnSpPr>
+          <p:nvPr/>
+        </p:nvCxnSpPr>
+        <p:spPr>
+          <a:xfrm flipV="1">
+            <a:off x="2674049" y="2522491"/>
+            <a:ext cx="583238" cy="380871"/>
+          </a:xfrm>
+          <a:prstGeom prst="curvedConnector3">
+            <a:avLst>
+              <a:gd name="adj1" fmla="val 50000"/>
+            </a:avLst>
+          </a:prstGeom>
+          <a:ln>
+            <a:solidFill>
+              <a:srgbClr val="00B050"/>
+            </a:solidFill>
+            <a:tailEnd type="triangle"/>
+          </a:ln>
+        </p:spPr>
+        <p:style>
+          <a:lnRef idx="1">
+            <a:schemeClr val="accent1"/>
+          </a:lnRef>
+          <a:fillRef idx="0">
+            <a:schemeClr val="accent1"/>
+          </a:fillRef>
+          <a:effectRef idx="0">
+            <a:schemeClr val="accent1"/>
+          </a:effectRef>
+          <a:fontRef idx="minor">
+            <a:schemeClr val="tx1"/>
+          </a:fontRef>
+        </p:style>
+      </p:cxnSp>
+      <p:cxnSp>
+        <p:nvCxnSpPr>
+          <p:cNvPr id="22" name="Connector: Curved 21">
+            <a:extLst>
+              <a:ext uri="{FF2B5EF4-FFF2-40B4-BE49-F238E27FC236}">
+                <a16:creationId xmlns:a16="http://schemas.microsoft.com/office/drawing/2014/main" id="{905C825C-6478-4F7A-8A03-A1ACDA3E44FE}"/>
+              </a:ext>
+            </a:extLst>
+          </p:cNvPr>
+          <p:cNvCxnSpPr>
+            <a:stCxn id="59" idx="3"/>
+            <a:endCxn id="35" idx="1"/>
+          </p:cNvCxnSpPr>
+          <p:nvPr/>
+        </p:nvCxnSpPr>
+        <p:spPr>
+          <a:xfrm>
+            <a:off x="3853813" y="2205720"/>
+            <a:ext cx="2639050" cy="656117"/>
+          </a:xfrm>
+          <a:prstGeom prst="curvedConnector3">
+            <a:avLst/>
+          </a:prstGeom>
+          <a:ln>
+            <a:solidFill>
+              <a:srgbClr val="00B050"/>
+            </a:solidFill>
+            <a:tailEnd type="triangle"/>
+          </a:ln>
+        </p:spPr>
+        <p:style>
+          <a:lnRef idx="1">
+            <a:schemeClr val="accent1"/>
+          </a:lnRef>
+          <a:fillRef idx="0">
+            <a:schemeClr val="accent1"/>
+          </a:fillRef>
+          <a:effectRef idx="0">
+            <a:schemeClr val="accent1"/>
+          </a:effectRef>
+          <a:fontRef idx="minor">
+            <a:schemeClr val="tx1"/>
+          </a:fontRef>
+        </p:style>
+      </p:cxnSp>
+      <p:sp>
+        <p:nvSpPr>
+          <p:cNvPr id="76" name="Rectangle 75">
+            <a:extLst>
+              <a:ext uri="{FF2B5EF4-FFF2-40B4-BE49-F238E27FC236}">
+                <a16:creationId xmlns:a16="http://schemas.microsoft.com/office/drawing/2014/main" id="{3B985D5A-661C-42D1-83C6-088DF8083DAC}"/>
+              </a:ext>
+            </a:extLst>
+          </p:cNvPr>
+          <p:cNvSpPr/>
+          <p:nvPr/>
+        </p:nvSpPr>
+        <p:spPr>
+          <a:xfrm>
+            <a:off x="6037042" y="2460761"/>
+            <a:ext cx="889529" cy="223829"/>
+          </a:xfrm>
+          <a:prstGeom prst="rect">
+            <a:avLst/>
+          </a:prstGeom>
+          <a:noFill/>
+          <a:ln>
+            <a:noFill/>
+          </a:ln>
+        </p:spPr>
+        <p:style>
+          <a:lnRef idx="2">
+            <a:schemeClr val="accent1">
+              <a:shade val="50000"/>
+            </a:schemeClr>
+          </a:lnRef>
+          <a:fillRef idx="1">
+            <a:schemeClr val="accent1"/>
+          </a:fillRef>
+          <a:effectRef idx="0">
+            <a:schemeClr val="accent1"/>
+          </a:effectRef>
+          <a:fontRef idx="minor">
+            <a:schemeClr val="lt1"/>
+          </a:fontRef>
+        </p:style>
+        <p:txBody>
+          <a:bodyPr rtlCol="0" anchor="ctr"/>
+          <a:lstStyle/>
+          <a:p>
+            <a:r>
+              <a:rPr lang="en-CA" sz="900" dirty="0">
+                <a:solidFill>
+                  <a:srgbClr val="FF0000"/>
+                </a:solidFill>
+              </a:rPr>
+              <a:t>Deny all traffic by default</a:t>
+            </a:r>
+          </a:p>
+        </p:txBody>
+      </p:sp>
+      <p:sp>
+        <p:nvSpPr>
+          <p:cNvPr id="77" name="Rectangle 76">
+            <a:extLst>
+              <a:ext uri="{FF2B5EF4-FFF2-40B4-BE49-F238E27FC236}">
+                <a16:creationId xmlns:a16="http://schemas.microsoft.com/office/drawing/2014/main" id="{26F4F871-8E5F-4E74-BAC0-1DC29E2B434D}"/>
+              </a:ext>
+            </a:extLst>
+          </p:cNvPr>
+          <p:cNvSpPr/>
+          <p:nvPr/>
+        </p:nvSpPr>
+        <p:spPr>
+          <a:xfrm>
+            <a:off x="7094979" y="2765122"/>
+            <a:ext cx="1329845" cy="403079"/>
+          </a:xfrm>
+          <a:prstGeom prst="rect">
+            <a:avLst/>
+          </a:prstGeom>
+          <a:noFill/>
+          <a:ln>
+            <a:noFill/>
+          </a:ln>
+        </p:spPr>
+        <p:style>
+          <a:lnRef idx="2">
+            <a:schemeClr val="accent1">
+              <a:shade val="50000"/>
+            </a:schemeClr>
+          </a:lnRef>
+          <a:fillRef idx="1">
+            <a:schemeClr val="accent1"/>
+          </a:fillRef>
+          <a:effectRef idx="0">
+            <a:schemeClr val="accent1"/>
+          </a:effectRef>
+          <a:fontRef idx="minor">
+            <a:schemeClr val="lt1"/>
+          </a:fontRef>
+        </p:style>
+        <p:txBody>
+          <a:bodyPr rtlCol="0" anchor="ctr"/>
+          <a:lstStyle/>
+          <a:p>
+            <a:r>
+              <a:rPr lang="en-CA" sz="900" dirty="0">
+                <a:solidFill>
+                  <a:srgbClr val="00B050"/>
+                </a:solidFill>
+              </a:rPr>
+              <a:t>Traffic filtering rules allow outbound access to key vault</a:t>
+            </a:r>
+          </a:p>
+        </p:txBody>
+      </p:sp>
+      <p:cxnSp>
+        <p:nvCxnSpPr>
+          <p:cNvPr id="24" name="Connector: Curved 23">
+            <a:extLst>
+              <a:ext uri="{FF2B5EF4-FFF2-40B4-BE49-F238E27FC236}">
+                <a16:creationId xmlns:a16="http://schemas.microsoft.com/office/drawing/2014/main" id="{1FB88C86-5471-4B6D-B19B-2A3D4A537411}"/>
+              </a:ext>
+            </a:extLst>
+          </p:cNvPr>
+          <p:cNvCxnSpPr>
+            <a:cxnSpLocks/>
+          </p:cNvCxnSpPr>
+          <p:nvPr/>
+        </p:nvCxnSpPr>
+        <p:spPr>
+          <a:xfrm flipV="1">
+            <a:off x="7132338" y="2903362"/>
+            <a:ext cx="1961907" cy="285750"/>
+          </a:xfrm>
+          <a:prstGeom prst="curvedConnector3">
+            <a:avLst>
+              <a:gd name="adj1" fmla="val 76184"/>
+            </a:avLst>
+          </a:prstGeom>
+          <a:ln>
+            <a:solidFill>
+              <a:srgbClr val="00B050"/>
+            </a:solidFill>
+            <a:tailEnd type="triangle"/>
+          </a:ln>
+        </p:spPr>
+        <p:style>
+          <a:lnRef idx="1">
+            <a:schemeClr val="accent1"/>
+          </a:lnRef>
+          <a:fillRef idx="0">
+            <a:schemeClr val="accent1"/>
+          </a:fillRef>
+          <a:effectRef idx="0">
+            <a:schemeClr val="accent1"/>
+          </a:effectRef>
+          <a:fontRef idx="minor">
+            <a:schemeClr val="tx1"/>
+          </a:fontRef>
+        </p:style>
+      </p:cxnSp>
+      <p:grpSp>
+        <p:nvGrpSpPr>
+          <p:cNvPr id="82" name="Group 81">
+            <a:extLst>
+              <a:ext uri="{FF2B5EF4-FFF2-40B4-BE49-F238E27FC236}">
+                <a16:creationId xmlns:a16="http://schemas.microsoft.com/office/drawing/2014/main" id="{28377ECE-C8DE-4725-88A7-68AEE93542D2}"/>
+              </a:ext>
+            </a:extLst>
+          </p:cNvPr>
+          <p:cNvGrpSpPr/>
+          <p:nvPr/>
+        </p:nvGrpSpPr>
+        <p:grpSpPr>
+          <a:xfrm>
+            <a:off x="6381056" y="4354316"/>
+            <a:ext cx="909089" cy="673481"/>
+            <a:chOff x="10270591" y="801364"/>
+            <a:chExt cx="909089" cy="673481"/>
+          </a:xfrm>
+        </p:grpSpPr>
+        <p:pic>
+          <p:nvPicPr>
+            <p:cNvPr id="83" name="Graphic 82">
+              <a:extLst>
+                <a:ext uri="{FF2B5EF4-FFF2-40B4-BE49-F238E27FC236}">
+                  <a16:creationId xmlns:a16="http://schemas.microsoft.com/office/drawing/2014/main" id="{0C468430-6F62-43E5-9D07-7965B7CC3CF3}"/>
+                </a:ext>
+              </a:extLst>
+            </p:cNvPr>
+            <p:cNvPicPr>
+              <a:picLocks noChangeAspect="1"/>
+            </p:cNvPicPr>
+            <p:nvPr/>
+          </p:nvPicPr>
+          <p:blipFill>
+            <a:blip r:embed="rId19">
+              <a:extLst>
+                <a:ext uri="{28A0092B-C50C-407E-A947-70E740481C1C}">
+                  <a14:useLocalDpi xmlns:a14="http://schemas.microsoft.com/office/drawing/2010/main" val="0"/>
+                </a:ext>
+                <a:ext uri="{96DAC541-7B7A-43D3-8B79-37D633B846F1}">
+                  <asvg:svgBlip xmlns:asvg="http://schemas.microsoft.com/office/drawing/2016/SVG/main" r:embed="rId20"/>
+                </a:ext>
+              </a:extLst>
+            </a:blip>
+            <a:stretch>
+              <a:fillRect/>
+            </a:stretch>
+          </p:blipFill>
+          <p:spPr>
+            <a:xfrm>
+              <a:off x="10538759" y="801364"/>
+              <a:ext cx="400110" cy="400110"/>
+            </a:xfrm>
+            <a:prstGeom prst="rect">
+              <a:avLst/>
+            </a:prstGeom>
+          </p:spPr>
+        </p:pic>
+        <p:sp>
+          <p:nvSpPr>
+            <p:cNvPr id="84" name="Rectangle 83">
+              <a:extLst>
+                <a:ext uri="{FF2B5EF4-FFF2-40B4-BE49-F238E27FC236}">
+                  <a16:creationId xmlns:a16="http://schemas.microsoft.com/office/drawing/2014/main" id="{DB2ADE94-5F9D-48BC-B4F6-67E6E011E235}"/>
+                </a:ext>
+              </a:extLst>
+            </p:cNvPr>
+            <p:cNvSpPr/>
+            <p:nvPr/>
+          </p:nvSpPr>
+          <p:spPr>
+            <a:xfrm>
+              <a:off x="10270591" y="1189094"/>
+              <a:ext cx="909089" cy="285751"/>
+            </a:xfrm>
+            <a:prstGeom prst="rect">
+              <a:avLst/>
+            </a:prstGeom>
+            <a:noFill/>
+            <a:ln>
+              <a:noFill/>
+            </a:ln>
+          </p:spPr>
+          <p:style>
+            <a:lnRef idx="2">
+              <a:schemeClr val="accent1">
+                <a:shade val="50000"/>
+              </a:schemeClr>
+            </a:lnRef>
+            <a:fillRef idx="1">
+              <a:schemeClr val="accent1"/>
+            </a:fillRef>
+            <a:effectRef idx="0">
+              <a:schemeClr val="accent1"/>
+            </a:effectRef>
+            <a:fontRef idx="minor">
+              <a:schemeClr val="lt1"/>
+            </a:fontRef>
+          </p:style>
+          <p:txBody>
+            <a:bodyPr rtlCol="0" anchor="ctr"/>
+            <a:lstStyle/>
+            <a:p>
+              <a:pPr algn="ctr"/>
+              <a:r>
+                <a:rPr lang="en-CA" sz="1000" b="1" dirty="0">
+                  <a:solidFill>
+                    <a:schemeClr val="tx1"/>
+                  </a:solidFill>
+                </a:rPr>
+                <a:t>Log analytics workspace</a:t>
+              </a:r>
+            </a:p>
+          </p:txBody>
+        </p:sp>
+      </p:grpSp>
+      <p:cxnSp>
+        <p:nvCxnSpPr>
+          <p:cNvPr id="85" name="Straight Arrow Connector 84">
+            <a:extLst>
+              <a:ext uri="{FF2B5EF4-FFF2-40B4-BE49-F238E27FC236}">
+                <a16:creationId xmlns:a16="http://schemas.microsoft.com/office/drawing/2014/main" id="{329E4B35-5DF2-4244-B695-8200DF8BA210}"/>
+              </a:ext>
+            </a:extLst>
+          </p:cNvPr>
+          <p:cNvCxnSpPr>
+            <a:cxnSpLocks/>
+          </p:cNvCxnSpPr>
+          <p:nvPr/>
+        </p:nvCxnSpPr>
+        <p:spPr>
+          <a:xfrm>
+            <a:off x="6835601" y="3469523"/>
+            <a:ext cx="5695" cy="899398"/>
+          </a:xfrm>
+          <a:prstGeom prst="straightConnector1">
+            <a:avLst/>
+          </a:prstGeom>
+          <a:ln>
+            <a:solidFill>
+              <a:schemeClr val="tx1"/>
+            </a:solidFill>
+            <a:tailEnd type="triangle"/>
+          </a:ln>
+        </p:spPr>
+        <p:style>
+          <a:lnRef idx="1">
+            <a:schemeClr val="accent1"/>
+          </a:lnRef>
+          <a:fillRef idx="0">
+            <a:schemeClr val="accent1"/>
+          </a:fillRef>
+          <a:effectRef idx="0">
+            <a:schemeClr val="accent1"/>
+          </a:effectRef>
+          <a:fontRef idx="minor">
+            <a:schemeClr val="tx1"/>
+          </a:fontRef>
+        </p:style>
+      </p:cxnSp>
+      <p:sp>
+        <p:nvSpPr>
+          <p:cNvPr id="86" name="Rectangle 85">
+            <a:extLst>
+              <a:ext uri="{FF2B5EF4-FFF2-40B4-BE49-F238E27FC236}">
+                <a16:creationId xmlns:a16="http://schemas.microsoft.com/office/drawing/2014/main" id="{1B6E43ED-04CC-4008-97EC-4EABBFB95B8A}"/>
+              </a:ext>
+            </a:extLst>
+          </p:cNvPr>
+          <p:cNvSpPr/>
+          <p:nvPr/>
+        </p:nvSpPr>
+        <p:spPr>
+          <a:xfrm>
+            <a:off x="5067962" y="4373337"/>
+            <a:ext cx="1458450" cy="421396"/>
+          </a:xfrm>
+          <a:prstGeom prst="rect">
+            <a:avLst/>
+          </a:prstGeom>
+          <a:noFill/>
+          <a:ln>
+            <a:noFill/>
+          </a:ln>
+        </p:spPr>
+        <p:style>
+          <a:lnRef idx="2">
+            <a:schemeClr val="accent1">
+              <a:shade val="50000"/>
+            </a:schemeClr>
+          </a:lnRef>
+          <a:fillRef idx="1">
+            <a:schemeClr val="accent1"/>
+          </a:fillRef>
+          <a:effectRef idx="0">
+            <a:schemeClr val="accent1"/>
+          </a:effectRef>
+          <a:fontRef idx="minor">
+            <a:schemeClr val="lt1"/>
+          </a:fontRef>
+        </p:style>
+        <p:txBody>
+          <a:bodyPr rtlCol="0" anchor="ctr"/>
+          <a:lstStyle/>
+          <a:p>
+            <a:pPr algn="ctr"/>
+            <a:r>
+              <a:rPr lang="en-CA" sz="800" dirty="0">
+                <a:solidFill>
+                  <a:schemeClr val="tx1"/>
+                </a:solidFill>
+              </a:rPr>
+              <a:t>Integrated with Azure Monitor for logging &amp; analyzing traffic</a:t>
+            </a:r>
+          </a:p>
+        </p:txBody>
+      </p:sp>
+      <p:sp>
+        <p:nvSpPr>
+          <p:cNvPr id="87" name="Rectangle 86">
+            <a:extLst>
+              <a:ext uri="{FF2B5EF4-FFF2-40B4-BE49-F238E27FC236}">
+                <a16:creationId xmlns:a16="http://schemas.microsoft.com/office/drawing/2014/main" id="{552D9A9A-C780-4562-AC0A-EDB0C74C5939}"/>
+              </a:ext>
+            </a:extLst>
+          </p:cNvPr>
+          <p:cNvSpPr/>
+          <p:nvPr/>
+        </p:nvSpPr>
+        <p:spPr>
+          <a:xfrm>
+            <a:off x="4195625" y="1972770"/>
+            <a:ext cx="992507" cy="227668"/>
+          </a:xfrm>
+          <a:prstGeom prst="rect">
+            <a:avLst/>
+          </a:prstGeom>
+          <a:noFill/>
+          <a:ln>
+            <a:noFill/>
+          </a:ln>
+        </p:spPr>
+        <p:style>
+          <a:lnRef idx="2">
+            <a:schemeClr val="accent1">
+              <a:shade val="50000"/>
+            </a:schemeClr>
+          </a:lnRef>
+          <a:fillRef idx="1">
+            <a:schemeClr val="accent1"/>
+          </a:fillRef>
+          <a:effectRef idx="0">
+            <a:schemeClr val="accent1"/>
+          </a:effectRef>
+          <a:fontRef idx="minor">
+            <a:schemeClr val="lt1"/>
+          </a:fontRef>
+        </p:style>
+        <p:txBody>
+          <a:bodyPr rtlCol="0" anchor="ctr"/>
+          <a:lstStyle/>
+          <a:p>
+            <a:r>
+              <a:rPr lang="en-CA" sz="900" dirty="0">
+                <a:solidFill>
+                  <a:srgbClr val="00B050"/>
+                </a:solidFill>
+              </a:rPr>
+              <a:t>Ext traffic routed to Azure Firewall</a:t>
+            </a:r>
+          </a:p>
+        </p:txBody>
+      </p:sp>
+      <p:cxnSp>
+        <p:nvCxnSpPr>
+          <p:cNvPr id="33" name="Straight Arrow Connector 32">
+            <a:extLst>
+              <a:ext uri="{FF2B5EF4-FFF2-40B4-BE49-F238E27FC236}">
+                <a16:creationId xmlns:a16="http://schemas.microsoft.com/office/drawing/2014/main" id="{0882FB9A-5457-4C04-BBA2-6657783E66FF}"/>
+              </a:ext>
+            </a:extLst>
+          </p:cNvPr>
+          <p:cNvCxnSpPr>
+            <a:stCxn id="83" idx="3"/>
+          </p:cNvCxnSpPr>
+          <p:nvPr/>
+        </p:nvCxnSpPr>
+        <p:spPr>
+          <a:xfrm>
+            <a:off x="7049334" y="4554371"/>
+            <a:ext cx="973193" cy="0"/>
+          </a:xfrm>
+          <a:prstGeom prst="straightConnector1">
+            <a:avLst/>
+          </a:prstGeom>
+          <a:ln>
+            <a:solidFill>
+              <a:schemeClr val="tx1"/>
+            </a:solidFill>
+            <a:tailEnd type="triangle"/>
+          </a:ln>
+        </p:spPr>
+        <p:style>
+          <a:lnRef idx="1">
+            <a:schemeClr val="accent1"/>
+          </a:lnRef>
+          <a:fillRef idx="0">
+            <a:schemeClr val="accent1"/>
+          </a:fillRef>
+          <a:effectRef idx="0">
+            <a:schemeClr val="accent1"/>
+          </a:effectRef>
+          <a:fontRef idx="minor">
+            <a:schemeClr val="tx1"/>
+          </a:fontRef>
+        </p:style>
+      </p:cxnSp>
+      <p:sp>
+        <p:nvSpPr>
+          <p:cNvPr id="93" name="Rectangle 92">
+            <a:extLst>
+              <a:ext uri="{FF2B5EF4-FFF2-40B4-BE49-F238E27FC236}">
+                <a16:creationId xmlns:a16="http://schemas.microsoft.com/office/drawing/2014/main" id="{9FC8884D-1250-4103-BD8D-4152D88C0B54}"/>
+              </a:ext>
+            </a:extLst>
+          </p:cNvPr>
+          <p:cNvSpPr/>
+          <p:nvPr/>
+        </p:nvSpPr>
+        <p:spPr>
+          <a:xfrm>
+            <a:off x="8024781" y="4368921"/>
+            <a:ext cx="1243071" cy="421396"/>
+          </a:xfrm>
+          <a:prstGeom prst="rect">
+            <a:avLst/>
+          </a:prstGeom>
+          <a:noFill/>
+          <a:ln>
+            <a:noFill/>
+          </a:ln>
+        </p:spPr>
+        <p:style>
+          <a:lnRef idx="2">
+            <a:schemeClr val="accent1">
+              <a:shade val="50000"/>
+            </a:schemeClr>
+          </a:lnRef>
+          <a:fillRef idx="1">
+            <a:schemeClr val="accent1"/>
+          </a:fillRef>
+          <a:effectRef idx="0">
+            <a:schemeClr val="accent1"/>
+          </a:effectRef>
+          <a:fontRef idx="minor">
+            <a:schemeClr val="lt1"/>
+          </a:fontRef>
+        </p:style>
+        <p:txBody>
+          <a:bodyPr rtlCol="0" anchor="ctr"/>
+          <a:lstStyle/>
+          <a:p>
+            <a:r>
+              <a:rPr lang="en-CA" sz="800" dirty="0">
+                <a:solidFill>
+                  <a:schemeClr val="tx1"/>
+                </a:solidFill>
+              </a:rPr>
+              <a:t>Export logs for monitoring &amp; alerting</a:t>
+            </a:r>
+          </a:p>
+        </p:txBody>
+      </p:sp>
+      <p:sp>
+        <p:nvSpPr>
+          <p:cNvPr id="94" name="Rectangle 93">
+            <a:extLst>
+              <a:ext uri="{FF2B5EF4-FFF2-40B4-BE49-F238E27FC236}">
+                <a16:creationId xmlns:a16="http://schemas.microsoft.com/office/drawing/2014/main" id="{AEBA2B29-C474-4B76-8B89-04E5645E9C98}"/>
+              </a:ext>
+            </a:extLst>
+          </p:cNvPr>
+          <p:cNvSpPr/>
+          <p:nvPr/>
+        </p:nvSpPr>
+        <p:spPr>
+          <a:xfrm>
+            <a:off x="8104647" y="3255339"/>
+            <a:ext cx="1243071" cy="403079"/>
+          </a:xfrm>
+          <a:prstGeom prst="rect">
+            <a:avLst/>
+          </a:prstGeom>
+          <a:noFill/>
+          <a:ln>
+            <a:noFill/>
+          </a:ln>
+        </p:spPr>
+        <p:style>
+          <a:lnRef idx="2">
+            <a:schemeClr val="accent1">
+              <a:shade val="50000"/>
+            </a:schemeClr>
+          </a:lnRef>
+          <a:fillRef idx="1">
+            <a:schemeClr val="accent1"/>
+          </a:fillRef>
+          <a:effectRef idx="0">
+            <a:schemeClr val="accent1"/>
+          </a:effectRef>
+          <a:fontRef idx="minor">
+            <a:schemeClr val="lt1"/>
+          </a:fontRef>
+        </p:style>
+        <p:txBody>
+          <a:bodyPr rtlCol="0" anchor="ctr"/>
+          <a:lstStyle/>
+          <a:p>
+            <a:pPr algn="ctr"/>
+            <a:r>
+              <a:rPr lang="en-CA" sz="800" dirty="0">
+                <a:solidFill>
+                  <a:srgbClr val="00B050"/>
+                </a:solidFill>
+              </a:rPr>
+              <a:t>Traffic goes through Microsoft backbone </a:t>
+            </a:r>
+          </a:p>
+          <a:p>
+            <a:pPr algn="ctr"/>
+            <a:r>
+              <a:rPr lang="en-CA" sz="800" dirty="0">
+                <a:solidFill>
+                  <a:srgbClr val="00B050"/>
+                </a:solidFill>
+              </a:rPr>
+              <a:t>network</a:t>
+            </a:r>
+          </a:p>
+        </p:txBody>
+      </p:sp>
+      <p:sp>
+        <p:nvSpPr>
+          <p:cNvPr id="95" name="Rectangle 94">
+            <a:extLst>
+              <a:ext uri="{FF2B5EF4-FFF2-40B4-BE49-F238E27FC236}">
+                <a16:creationId xmlns:a16="http://schemas.microsoft.com/office/drawing/2014/main" id="{D7913D6D-6CAB-4BD0-A2B7-CE10E5D966DC}"/>
+              </a:ext>
+            </a:extLst>
+          </p:cNvPr>
+          <p:cNvSpPr/>
+          <p:nvPr/>
+        </p:nvSpPr>
+        <p:spPr>
+          <a:xfrm>
+            <a:off x="1090075" y="5146651"/>
+            <a:ext cx="4083263" cy="1128403"/>
+          </a:xfrm>
+          <a:prstGeom prst="rect">
+            <a:avLst/>
+          </a:prstGeom>
+          <a:noFill/>
+          <a:ln>
+            <a:noFill/>
+          </a:ln>
+        </p:spPr>
+        <p:style>
+          <a:lnRef idx="2">
+            <a:schemeClr val="accent1">
+              <a:shade val="50000"/>
+            </a:schemeClr>
+          </a:lnRef>
+          <a:fillRef idx="1">
+            <a:schemeClr val="accent1"/>
+          </a:fillRef>
+          <a:effectRef idx="0">
+            <a:schemeClr val="accent1"/>
+          </a:effectRef>
+          <a:fontRef idx="minor">
+            <a:schemeClr val="lt1"/>
+          </a:fontRef>
+        </p:style>
+        <p:txBody>
+          <a:bodyPr rtlCol="0" anchor="ctr"/>
+          <a:lstStyle/>
+          <a:p>
+            <a:r>
+              <a:rPr lang="en-CA" sz="1200" b="1" dirty="0">
+                <a:solidFill>
+                  <a:schemeClr val="tx1"/>
+                </a:solidFill>
+              </a:rPr>
+              <a:t>Comments</a:t>
+            </a:r>
+          </a:p>
+          <a:p>
+            <a:pPr marL="171450" indent="-171450">
+              <a:buFont typeface="Arial" panose="020B0604020202020204" pitchFamily="34" charset="0"/>
+              <a:buChar char="•"/>
+            </a:pPr>
+            <a:endParaRPr lang="en-CA" sz="1200" dirty="0">
+              <a:solidFill>
+                <a:schemeClr val="tx1"/>
+              </a:solidFill>
+            </a:endParaRPr>
+          </a:p>
+          <a:p>
+            <a:pPr marL="171450" indent="-171450">
+              <a:buFont typeface="Arial" panose="020B0604020202020204" pitchFamily="34" charset="0"/>
+              <a:buChar char="•"/>
+            </a:pPr>
+            <a:r>
+              <a:rPr lang="en-CA" sz="1200" dirty="0">
+                <a:solidFill>
+                  <a:schemeClr val="tx1"/>
+                </a:solidFill>
+              </a:rPr>
+              <a:t>Service Endpoint enabled only for AzureFirewallSubnet</a:t>
+            </a:r>
+          </a:p>
+          <a:p>
+            <a:pPr marL="171450" indent="-171450">
+              <a:buFont typeface="Arial" panose="020B0604020202020204" pitchFamily="34" charset="0"/>
+              <a:buChar char="•"/>
+            </a:pPr>
+            <a:r>
+              <a:rPr lang="en-CA" sz="1200" dirty="0">
+                <a:solidFill>
+                  <a:schemeClr val="tx1"/>
+                </a:solidFill>
+              </a:rPr>
+              <a:t>Connects to Public IP through Azure backbone network</a:t>
+            </a:r>
+          </a:p>
+          <a:p>
+            <a:pPr marL="171450" indent="-171450">
+              <a:buFont typeface="Arial" panose="020B0604020202020204" pitchFamily="34" charset="0"/>
+              <a:buChar char="•"/>
+            </a:pPr>
+            <a:r>
+              <a:rPr lang="en-CA" sz="1200" dirty="0">
+                <a:solidFill>
+                  <a:schemeClr val="tx1"/>
+                </a:solidFill>
+              </a:rPr>
+              <a:t>Source IP is switched to Private</a:t>
+            </a:r>
+          </a:p>
+          <a:p>
+            <a:pPr marL="171450" indent="-171450">
+              <a:buFont typeface="Arial" panose="020B0604020202020204" pitchFamily="34" charset="0"/>
+              <a:buChar char="•"/>
+            </a:pPr>
+            <a:r>
+              <a:rPr lang="en-CA" sz="1200" dirty="0">
+                <a:solidFill>
+                  <a:schemeClr val="tx1"/>
+                </a:solidFill>
+              </a:rPr>
+              <a:t>No VNet peering in case of CDP</a:t>
+            </a:r>
+          </a:p>
+        </p:txBody>
+      </p:sp>
+    </p:spTree>
+    <p:extLst>
+      <p:ext uri="{BB962C8B-B14F-4D97-AF65-F5344CB8AC3E}">
+        <p14:creationId xmlns:p14="http://schemas.microsoft.com/office/powerpoint/2010/main" val="2587440602"/>
+      </p:ext>
+    </p:extLst>
+  </p:cSld>
+  <p:clrMapOvr>
+    <a:masterClrMapping/>
+  </p:clrMapOvr>
+</p:sld>
+</file>
+
+<file path=ppt/slides/slide2.xml><?xml version="1.0" encoding="utf-8"?>
 <p:sld xmlns:a="http://schemas.openxmlformats.org/drawingml/2006/main" xmlns:r="http://schemas.openxmlformats.org/officeDocument/2006/relationships" xmlns:p="http://schemas.openxmlformats.org/presentationml/2006/main">
   <p:cSld>
     <p:spTree>
@@ -6964,7 +9966,7 @@
 </p:sld>
 </file>
 
-<file path=ppt/slides/slide2.xml><?xml version="1.0" encoding="utf-8"?>
+<file path=ppt/slides/slide3.xml><?xml version="1.0" encoding="utf-8"?>
 <p:sld xmlns:a="http://schemas.openxmlformats.org/drawingml/2006/main" xmlns:r="http://schemas.openxmlformats.org/officeDocument/2006/relationships" xmlns:p="http://schemas.openxmlformats.org/presentationml/2006/main">
   <p:cSld>
     <p:spTree>
@@ -7440,7 +10442,7 @@
 </p:sld>
 </file>
 
-<file path=ppt/slides/slide3.xml><?xml version="1.0" encoding="utf-8"?>
+<file path=ppt/slides/slide4.xml><?xml version="1.0" encoding="utf-8"?>
 <p:sld xmlns:a="http://schemas.openxmlformats.org/drawingml/2006/main" xmlns:r="http://schemas.openxmlformats.org/officeDocument/2006/relationships" xmlns:p="http://schemas.openxmlformats.org/presentationml/2006/main">
   <p:cSld>
     <p:spTree>
@@ -7935,9 +10937,9 @@
         <p:grpSpPr>
           <a:xfrm>
             <a:off x="3947585" y="3429000"/>
-            <a:ext cx="2862861" cy="2379543"/>
+            <a:ext cx="2785265" cy="2379543"/>
             <a:chOff x="4236132" y="2642781"/>
-            <a:chExt cx="2862861" cy="2379543"/>
+            <a:chExt cx="2785265" cy="2379543"/>
           </a:xfrm>
         </p:grpSpPr>
         <p:sp>
@@ -8154,123 +11156,6 @@
             </a:p>
           </p:txBody>
         </p:sp>
-        <p:grpSp>
-          <p:nvGrpSpPr>
-            <p:cNvPr id="17" name="Group 16">
-              <a:extLst>
-                <a:ext uri="{FF2B5EF4-FFF2-40B4-BE49-F238E27FC236}">
-                  <a16:creationId xmlns:a16="http://schemas.microsoft.com/office/drawing/2014/main" id="{6DFF6914-9121-4AB9-BC2B-879BA522F9B7}"/>
-                </a:ext>
-              </a:extLst>
-            </p:cNvPr>
-            <p:cNvGrpSpPr/>
-            <p:nvPr/>
-          </p:nvGrpSpPr>
-          <p:grpSpPr>
-            <a:xfrm>
-              <a:off x="6011209" y="4341489"/>
-              <a:ext cx="1087784" cy="678393"/>
-              <a:chOff x="10247359" y="6014407"/>
-              <a:chExt cx="1087784" cy="678393"/>
-            </a:xfrm>
-          </p:grpSpPr>
-          <p:sp>
-            <p:nvSpPr>
-              <p:cNvPr id="23" name="Rectangle 22">
-                <a:extLst>
-                  <a:ext uri="{FF2B5EF4-FFF2-40B4-BE49-F238E27FC236}">
-                    <a16:creationId xmlns:a16="http://schemas.microsoft.com/office/drawing/2014/main" id="{3D9CED80-E41F-4EBF-8515-ADAEAEF9554A}"/>
-                  </a:ext>
-                </a:extLst>
-              </p:cNvPr>
-              <p:cNvSpPr/>
-              <p:nvPr/>
-            </p:nvSpPr>
-            <p:spPr>
-              <a:xfrm>
-                <a:off x="10247359" y="6407049"/>
-                <a:ext cx="1087784" cy="285751"/>
-              </a:xfrm>
-              <a:prstGeom prst="rect">
-                <a:avLst/>
-              </a:prstGeom>
-              <a:noFill/>
-              <a:ln>
-                <a:noFill/>
-              </a:ln>
-            </p:spPr>
-            <p:style>
-              <a:lnRef idx="2">
-                <a:schemeClr val="accent1">
-                  <a:shade val="50000"/>
-                </a:schemeClr>
-              </a:lnRef>
-              <a:fillRef idx="1">
-                <a:schemeClr val="accent1"/>
-              </a:fillRef>
-              <a:effectRef idx="0">
-                <a:schemeClr val="accent1"/>
-              </a:effectRef>
-              <a:fontRef idx="minor">
-                <a:schemeClr val="lt1"/>
-              </a:fontRef>
-            </p:style>
-            <p:txBody>
-              <a:bodyPr rtlCol="0" anchor="ctr"/>
-              <a:lstStyle/>
-              <a:p>
-                <a:pPr algn="ctr"/>
-                <a:r>
-                  <a:rPr lang="en-CA" sz="1000" b="1" dirty="0">
-                    <a:solidFill>
-                      <a:schemeClr val="tx1"/>
-                    </a:solidFill>
-                  </a:rPr>
-                  <a:t>Service Endpoint</a:t>
-                </a:r>
-              </a:p>
-            </p:txBody>
-          </p:sp>
-          <p:pic>
-            <p:nvPicPr>
-              <p:cNvPr id="24" name="Graphic 23">
-                <a:extLst>
-                  <a:ext uri="{FF2B5EF4-FFF2-40B4-BE49-F238E27FC236}">
-                    <a16:creationId xmlns:a16="http://schemas.microsoft.com/office/drawing/2014/main" id="{482944B2-A507-4BCB-96D3-A0A151870BC4}"/>
-                  </a:ext>
-                </a:extLst>
-              </p:cNvPr>
-              <p:cNvPicPr>
-                <a:picLocks noChangeAspect="1"/>
-              </p:cNvPicPr>
-              <p:nvPr/>
-            </p:nvPicPr>
-            <p:blipFill>
-              <a:blip r:embed="rId4">
-                <a:extLst>
-                  <a:ext uri="{28A0092B-C50C-407E-A947-70E740481C1C}">
-                    <a14:useLocalDpi xmlns:a14="http://schemas.microsoft.com/office/drawing/2010/main" val="0"/>
-                  </a:ext>
-                  <a:ext uri="{96DAC541-7B7A-43D3-8B79-37D633B846F1}">
-                    <asvg:svgBlip xmlns:asvg="http://schemas.microsoft.com/office/drawing/2016/SVG/main" r:embed="rId5"/>
-                  </a:ext>
-                </a:extLst>
-              </a:blip>
-              <a:stretch>
-                <a:fillRect/>
-              </a:stretch>
-            </p:blipFill>
-            <p:spPr>
-              <a:xfrm>
-                <a:off x="10631340" y="6014407"/>
-                <a:ext cx="476250" cy="476250"/>
-              </a:xfrm>
-              <a:prstGeom prst="rect">
-                <a:avLst/>
-              </a:prstGeom>
-            </p:spPr>
-          </p:pic>
-        </p:grpSp>
         <p:sp>
           <p:nvSpPr>
             <p:cNvPr id="18" name="Rectangle 17">
@@ -8420,13 +11305,13 @@
               <p:nvPr/>
             </p:nvPicPr>
             <p:blipFill>
-              <a:blip r:embed="rId6">
+              <a:blip r:embed="rId4">
                 <a:extLst>
                   <a:ext uri="{28A0092B-C50C-407E-A947-70E740481C1C}">
                     <a14:useLocalDpi xmlns:a14="http://schemas.microsoft.com/office/drawing/2010/main" val="0"/>
                   </a:ext>
                   <a:ext uri="{96DAC541-7B7A-43D3-8B79-37D633B846F1}">
-                    <asvg:svgBlip xmlns:asvg="http://schemas.microsoft.com/office/drawing/2016/SVG/main" r:embed="rId7"/>
+                    <asvg:svgBlip xmlns:asvg="http://schemas.microsoft.com/office/drawing/2016/SVG/main" r:embed="rId5"/>
                   </a:ext>
                 </a:extLst>
               </a:blip>
@@ -8943,13 +11828,13 @@
               <p:nvPr/>
             </p:nvPicPr>
             <p:blipFill>
-              <a:blip r:embed="rId8">
+              <a:blip r:embed="rId6">
                 <a:extLst>
                   <a:ext uri="{28A0092B-C50C-407E-A947-70E740481C1C}">
                     <a14:useLocalDpi xmlns:a14="http://schemas.microsoft.com/office/drawing/2010/main" val="0"/>
                   </a:ext>
                   <a:ext uri="{96DAC541-7B7A-43D3-8B79-37D633B846F1}">
-                    <asvg:svgBlip xmlns:asvg="http://schemas.microsoft.com/office/drawing/2016/SVG/main" r:embed="rId9"/>
+                    <asvg:svgBlip xmlns:asvg="http://schemas.microsoft.com/office/drawing/2016/SVG/main" r:embed="rId7"/>
                   </a:ext>
                 </a:extLst>
               </a:blip>
@@ -9161,13 +12046,13 @@
             <p:nvPr/>
           </p:nvPicPr>
           <p:blipFill>
-            <a:blip r:embed="rId10">
+            <a:blip r:embed="rId8">
               <a:extLst>
                 <a:ext uri="{28A0092B-C50C-407E-A947-70E740481C1C}">
                   <a14:useLocalDpi xmlns:a14="http://schemas.microsoft.com/office/drawing/2010/main" val="0"/>
                 </a:ext>
                 <a:ext uri="{96DAC541-7B7A-43D3-8B79-37D633B846F1}">
-                  <asvg:svgBlip xmlns:asvg="http://schemas.microsoft.com/office/drawing/2016/SVG/main" r:embed="rId11"/>
+                  <asvg:svgBlip xmlns:asvg="http://schemas.microsoft.com/office/drawing/2016/SVG/main" r:embed="rId9"/>
                 </a:ext>
               </a:extLst>
             </a:blip>
@@ -9880,13 +12765,13 @@
             <p:nvPr/>
           </p:nvPicPr>
           <p:blipFill>
-            <a:blip r:embed="rId10">
+            <a:blip r:embed="rId8">
               <a:extLst>
                 <a:ext uri="{28A0092B-C50C-407E-A947-70E740481C1C}">
                   <a14:useLocalDpi xmlns:a14="http://schemas.microsoft.com/office/drawing/2010/main" val="0"/>
                 </a:ext>
                 <a:ext uri="{96DAC541-7B7A-43D3-8B79-37D633B846F1}">
-                  <asvg:svgBlip xmlns:asvg="http://schemas.microsoft.com/office/drawing/2016/SVG/main" r:embed="rId11"/>
+                  <asvg:svgBlip xmlns:asvg="http://schemas.microsoft.com/office/drawing/2016/SVG/main" r:embed="rId9"/>
                 </a:ext>
               </a:extLst>
             </a:blip>
@@ -10017,7 +12902,7 @@
               <p:nvPr/>
             </p:nvPicPr>
             <p:blipFill>
-              <a:blip r:embed="rId12">
+              <a:blip r:embed="rId10">
                 <a:extLst>
                   <a:ext uri="{28A0092B-C50C-407E-A947-70E740481C1C}">
                     <a14:useLocalDpi xmlns:a14="http://schemas.microsoft.com/office/drawing/2010/main" val="0"/>
@@ -10225,13 +13110,13 @@
             <p:nvPr/>
           </p:nvPicPr>
           <p:blipFill>
-            <a:blip r:embed="rId13">
+            <a:blip r:embed="rId11">
               <a:extLst>
                 <a:ext uri="{28A0092B-C50C-407E-A947-70E740481C1C}">
                   <a14:useLocalDpi xmlns:a14="http://schemas.microsoft.com/office/drawing/2010/main" val="0"/>
                 </a:ext>
                 <a:ext uri="{96DAC541-7B7A-43D3-8B79-37D633B846F1}">
-                  <asvg:svgBlip xmlns:asvg="http://schemas.microsoft.com/office/drawing/2016/SVG/main" r:embed="rId14"/>
+                  <asvg:svgBlip xmlns:asvg="http://schemas.microsoft.com/office/drawing/2016/SVG/main" r:embed="rId12"/>
                 </a:ext>
               </a:extLst>
             </a:blip>
@@ -10363,7 +13248,7 @@
           <p:nvPr/>
         </p:nvPicPr>
         <p:blipFill>
-          <a:blip r:embed="rId15">
+          <a:blip r:embed="rId13">
             <a:extLst>
               <a:ext uri="{28A0092B-C50C-407E-A947-70E740481C1C}">
                 <a14:useLocalDpi xmlns:a14="http://schemas.microsoft.com/office/drawing/2010/main" val="0"/>
@@ -10516,13 +13401,13 @@
           <p:nvPr/>
         </p:nvPicPr>
         <p:blipFill>
-          <a:blip r:embed="rId16">
+          <a:blip r:embed="rId14">
             <a:extLst>
               <a:ext uri="{28A0092B-C50C-407E-A947-70E740481C1C}">
                 <a14:useLocalDpi xmlns:a14="http://schemas.microsoft.com/office/drawing/2010/main" val="0"/>
               </a:ext>
               <a:ext uri="{96DAC541-7B7A-43D3-8B79-37D633B846F1}">
-                <asvg:svgBlip xmlns:asvg="http://schemas.microsoft.com/office/drawing/2016/SVG/main" r:embed="rId17"/>
+                <asvg:svgBlip xmlns:asvg="http://schemas.microsoft.com/office/drawing/2016/SVG/main" r:embed="rId15"/>
               </a:ext>
             </a:extLst>
           </a:blip>
@@ -10575,13 +13460,13 @@
             <p:nvPr/>
           </p:nvPicPr>
           <p:blipFill>
-            <a:blip r:embed="rId18">
+            <a:blip r:embed="rId16">
               <a:extLst>
                 <a:ext uri="{28A0092B-C50C-407E-A947-70E740481C1C}">
                   <a14:useLocalDpi xmlns:a14="http://schemas.microsoft.com/office/drawing/2010/main" val="0"/>
                 </a:ext>
                 <a:ext uri="{96DAC541-7B7A-43D3-8B79-37D633B846F1}">
-                  <asvg:svgBlip xmlns:asvg="http://schemas.microsoft.com/office/drawing/2016/SVG/main" r:embed="rId19"/>
+                  <asvg:svgBlip xmlns:asvg="http://schemas.microsoft.com/office/drawing/2016/SVG/main" r:embed="rId17"/>
                 </a:ext>
               </a:extLst>
             </a:blip>
@@ -10701,13 +13586,13 @@
             <p:nvPr/>
           </p:nvPicPr>
           <p:blipFill>
-            <a:blip r:embed="rId18">
+            <a:blip r:embed="rId16">
               <a:extLst>
                 <a:ext uri="{28A0092B-C50C-407E-A947-70E740481C1C}">
                   <a14:useLocalDpi xmlns:a14="http://schemas.microsoft.com/office/drawing/2010/main" val="0"/>
                 </a:ext>
                 <a:ext uri="{96DAC541-7B7A-43D3-8B79-37D633B846F1}">
-                  <asvg:svgBlip xmlns:asvg="http://schemas.microsoft.com/office/drawing/2016/SVG/main" r:embed="rId19"/>
+                  <asvg:svgBlip xmlns:asvg="http://schemas.microsoft.com/office/drawing/2016/SVG/main" r:embed="rId17"/>
                 </a:ext>
               </a:extLst>
             </a:blip>
@@ -10827,13 +13712,13 @@
             <p:nvPr/>
           </p:nvPicPr>
           <p:blipFill>
-            <a:blip r:embed="rId18">
+            <a:blip r:embed="rId16">
               <a:extLst>
                 <a:ext uri="{28A0092B-C50C-407E-A947-70E740481C1C}">
                   <a14:useLocalDpi xmlns:a14="http://schemas.microsoft.com/office/drawing/2010/main" val="0"/>
                 </a:ext>
                 <a:ext uri="{96DAC541-7B7A-43D3-8B79-37D633B846F1}">
-                  <asvg:svgBlip xmlns:asvg="http://schemas.microsoft.com/office/drawing/2016/SVG/main" r:embed="rId19"/>
+                  <asvg:svgBlip xmlns:asvg="http://schemas.microsoft.com/office/drawing/2016/SVG/main" r:embed="rId17"/>
                 </a:ext>
               </a:extLst>
             </a:blip>
@@ -10974,11 +13859,11 @@
           <p:nvPr/>
         </p:nvCxnSpPr>
         <p:spPr>
-          <a:xfrm rot="5400000" flipH="1" flipV="1">
-            <a:off x="1881318" y="4172512"/>
-            <a:ext cx="553075" cy="417442"/>
+          <a:xfrm flipV="1">
+            <a:off x="1868831" y="4104695"/>
+            <a:ext cx="497745" cy="405360"/>
           </a:xfrm>
-          <a:prstGeom prst="curvedConnector3">
+          <a:prstGeom prst="curvedConnector2">
             <a:avLst/>
           </a:prstGeom>
           <a:ln>
@@ -11590,7 +14475,7 @@
         </p:nvGrpSpPr>
         <p:grpSpPr>
           <a:xfrm>
-            <a:off x="1899164" y="5046449"/>
+            <a:off x="1833118" y="4980572"/>
             <a:ext cx="2226572" cy="853084"/>
             <a:chOff x="347685" y="5790096"/>
             <a:chExt cx="2226572" cy="853084"/>
@@ -11688,13 +14573,13 @@
               <p:nvPr/>
             </p:nvPicPr>
             <p:blipFill>
-              <a:blip r:embed="rId20">
+              <a:blip r:embed="rId18">
                 <a:extLst>
                   <a:ext uri="{28A0092B-C50C-407E-A947-70E740481C1C}">
                     <a14:useLocalDpi xmlns:a14="http://schemas.microsoft.com/office/drawing/2010/main" val="0"/>
                   </a:ext>
                   <a:ext uri="{96DAC541-7B7A-43D3-8B79-37D633B846F1}">
-                    <asvg:svgBlip xmlns:asvg="http://schemas.microsoft.com/office/drawing/2016/SVG/main" r:embed="rId21"/>
+                    <asvg:svgBlip xmlns:asvg="http://schemas.microsoft.com/office/drawing/2016/SVG/main" r:embed="rId19"/>
                   </a:ext>
                 </a:extLst>
               </a:blip>
@@ -11727,13 +14612,13 @@
               <p:nvPr/>
             </p:nvPicPr>
             <p:blipFill>
-              <a:blip r:embed="rId22">
+              <a:blip r:embed="rId20">
                 <a:extLst>
                   <a:ext uri="{28A0092B-C50C-407E-A947-70E740481C1C}">
                     <a14:useLocalDpi xmlns:a14="http://schemas.microsoft.com/office/drawing/2010/main" val="0"/>
                   </a:ext>
                   <a:ext uri="{96DAC541-7B7A-43D3-8B79-37D633B846F1}">
-                    <asvg:svgBlip xmlns:asvg="http://schemas.microsoft.com/office/drawing/2016/SVG/main" r:embed="rId23"/>
+                    <asvg:svgBlip xmlns:asvg="http://schemas.microsoft.com/office/drawing/2016/SVG/main" r:embed="rId21"/>
                   </a:ext>
                 </a:extLst>
               </a:blip>
@@ -11860,53 +14745,6 @@
           </p:txBody>
         </p:sp>
       </p:grpSp>
-      <p:cxnSp>
-        <p:nvCxnSpPr>
-          <p:cNvPr id="46" name="Connector: Curved 45">
-            <a:extLst>
-              <a:ext uri="{FF2B5EF4-FFF2-40B4-BE49-F238E27FC236}">
-                <a16:creationId xmlns:a16="http://schemas.microsoft.com/office/drawing/2014/main" id="{2A969B5F-0CBB-470F-9363-14FD18AFB78C}"/>
-              </a:ext>
-            </a:extLst>
-          </p:cNvPr>
-          <p:cNvCxnSpPr>
-            <a:cxnSpLocks/>
-            <a:endCxn id="22" idx="1"/>
-          </p:cNvCxnSpPr>
-          <p:nvPr/>
-        </p:nvCxnSpPr>
-        <p:spPr>
-          <a:xfrm>
-            <a:off x="2029735" y="4877784"/>
-            <a:ext cx="2733795" cy="292747"/>
-          </a:xfrm>
-          <a:prstGeom prst="curvedConnector3">
-            <a:avLst>
-              <a:gd name="adj1" fmla="val 50000"/>
-            </a:avLst>
-          </a:prstGeom>
-          <a:ln>
-            <a:solidFill>
-              <a:srgbClr val="00B050"/>
-            </a:solidFill>
-            <a:tailEnd type="triangle"/>
-          </a:ln>
-        </p:spPr>
-        <p:style>
-          <a:lnRef idx="1">
-            <a:schemeClr val="accent1"/>
-          </a:lnRef>
-          <a:fillRef idx="0">
-            <a:schemeClr val="accent1"/>
-          </a:fillRef>
-          <a:effectRef idx="0">
-            <a:schemeClr val="accent1"/>
-          </a:effectRef>
-          <a:fontRef idx="minor">
-            <a:schemeClr val="tx1"/>
-          </a:fontRef>
-        </p:style>
-      </p:cxnSp>
       <p:sp>
         <p:nvSpPr>
           <p:cNvPr id="114" name="Rectangle 113">
@@ -11921,7 +14759,7 @@
         </p:nvSpPr>
         <p:spPr>
           <a:xfrm>
-            <a:off x="3500518" y="4919118"/>
+            <a:off x="4214595" y="4803032"/>
             <a:ext cx="291841" cy="179938"/>
           </a:xfrm>
           <a:prstGeom prst="rect">
@@ -12181,335 +15019,6 @@
           </a:p>
         </p:txBody>
       </p:sp>
-      <p:grpSp>
-        <p:nvGrpSpPr>
-          <p:cNvPr id="137" name="Group 136">
-            <a:extLst>
-              <a:ext uri="{FF2B5EF4-FFF2-40B4-BE49-F238E27FC236}">
-                <a16:creationId xmlns:a16="http://schemas.microsoft.com/office/drawing/2014/main" id="{2AB08ECC-4BCF-47EC-83B2-5C671FEB927E}"/>
-              </a:ext>
-            </a:extLst>
-          </p:cNvPr>
-          <p:cNvGrpSpPr/>
-          <p:nvPr/>
-        </p:nvGrpSpPr>
-        <p:grpSpPr>
-          <a:xfrm>
-            <a:off x="11176293" y="5933248"/>
-            <a:ext cx="970573" cy="790037"/>
-            <a:chOff x="10899931" y="2303928"/>
-            <a:chExt cx="970573" cy="790037"/>
-          </a:xfrm>
-        </p:grpSpPr>
-        <p:grpSp>
-          <p:nvGrpSpPr>
-            <p:cNvPr id="138" name="Group 137">
-              <a:extLst>
-                <a:ext uri="{FF2B5EF4-FFF2-40B4-BE49-F238E27FC236}">
-                  <a16:creationId xmlns:a16="http://schemas.microsoft.com/office/drawing/2014/main" id="{1880D116-13FB-45EE-9C46-89A8313DB0B5}"/>
-                </a:ext>
-              </a:extLst>
-            </p:cNvPr>
-            <p:cNvGrpSpPr/>
-            <p:nvPr/>
-          </p:nvGrpSpPr>
-          <p:grpSpPr>
-            <a:xfrm>
-              <a:off x="10899931" y="2303928"/>
-              <a:ext cx="942975" cy="666822"/>
-              <a:chOff x="5667375" y="2971728"/>
-              <a:chExt cx="942975" cy="666822"/>
-            </a:xfrm>
-          </p:grpSpPr>
-          <p:pic>
-            <p:nvPicPr>
-              <p:cNvPr id="140" name="Picture 139" descr="Logo&#10;&#10;Description automatically generated">
-                <a:extLst>
-                  <a:ext uri="{FF2B5EF4-FFF2-40B4-BE49-F238E27FC236}">
-                    <a16:creationId xmlns:a16="http://schemas.microsoft.com/office/drawing/2014/main" id="{C7A6FC65-4008-429F-A1C5-5B9A91F35739}"/>
-                  </a:ext>
-                </a:extLst>
-              </p:cNvPr>
-              <p:cNvPicPr>
-                <a:picLocks noChangeAspect="1"/>
-              </p:cNvPicPr>
-              <p:nvPr/>
-            </p:nvPicPr>
-            <p:blipFill>
-              <a:blip r:embed="rId12">
-                <a:extLst>
-                  <a:ext uri="{28A0092B-C50C-407E-A947-70E740481C1C}">
-                    <a14:useLocalDpi xmlns:a14="http://schemas.microsoft.com/office/drawing/2010/main" val="0"/>
-                  </a:ext>
-                </a:extLst>
-              </a:blip>
-              <a:stretch>
-                <a:fillRect/>
-              </a:stretch>
-            </p:blipFill>
-            <p:spPr>
-              <a:xfrm>
-                <a:off x="5910491" y="2971728"/>
-                <a:ext cx="448532" cy="448532"/>
-              </a:xfrm>
-              <a:prstGeom prst="rect">
-                <a:avLst/>
-              </a:prstGeom>
-            </p:spPr>
-          </p:pic>
-          <p:sp>
-            <p:nvSpPr>
-              <p:cNvPr id="141" name="Rectangle 140">
-                <a:extLst>
-                  <a:ext uri="{FF2B5EF4-FFF2-40B4-BE49-F238E27FC236}">
-                    <a16:creationId xmlns:a16="http://schemas.microsoft.com/office/drawing/2014/main" id="{AF65972C-9E62-4684-918D-D9BA8A1FF20A}"/>
-                  </a:ext>
-                </a:extLst>
-              </p:cNvPr>
-              <p:cNvSpPr/>
-              <p:nvPr/>
-            </p:nvSpPr>
-            <p:spPr>
-              <a:xfrm>
-                <a:off x="5667375" y="3352799"/>
-                <a:ext cx="942975" cy="285751"/>
-              </a:xfrm>
-              <a:prstGeom prst="rect">
-                <a:avLst/>
-              </a:prstGeom>
-              <a:noFill/>
-              <a:ln>
-                <a:noFill/>
-              </a:ln>
-            </p:spPr>
-            <p:style>
-              <a:lnRef idx="2">
-                <a:schemeClr val="accent1">
-                  <a:shade val="50000"/>
-                </a:schemeClr>
-              </a:lnRef>
-              <a:fillRef idx="1">
-                <a:schemeClr val="accent1"/>
-              </a:fillRef>
-              <a:effectRef idx="0">
-                <a:schemeClr val="accent1"/>
-              </a:effectRef>
-              <a:fontRef idx="minor">
-                <a:schemeClr val="lt1"/>
-              </a:fontRef>
-            </p:style>
-            <p:txBody>
-              <a:bodyPr rtlCol="0" anchor="ctr"/>
-              <a:lstStyle/>
-              <a:p>
-                <a:pPr algn="ctr"/>
-                <a:r>
-                  <a:rPr lang="en-CA" sz="1000" b="1" dirty="0">
-                    <a:solidFill>
-                      <a:schemeClr val="tx1"/>
-                    </a:solidFill>
-                  </a:rPr>
-                  <a:t>Key Vault</a:t>
-                </a:r>
-              </a:p>
-            </p:txBody>
-          </p:sp>
-        </p:grpSp>
-        <p:sp>
-          <p:nvSpPr>
-            <p:cNvPr id="139" name="Rectangle 138">
-              <a:extLst>
-                <a:ext uri="{FF2B5EF4-FFF2-40B4-BE49-F238E27FC236}">
-                  <a16:creationId xmlns:a16="http://schemas.microsoft.com/office/drawing/2014/main" id="{B542BCE5-598F-48ED-AC2C-51CA00F5F47F}"/>
-                </a:ext>
-              </a:extLst>
-            </p:cNvPr>
-            <p:cNvSpPr/>
-            <p:nvPr/>
-          </p:nvSpPr>
-          <p:spPr>
-            <a:xfrm>
-              <a:off x="10932427" y="2847744"/>
-              <a:ext cx="938077" cy="246221"/>
-            </a:xfrm>
-            <a:prstGeom prst="rect">
-              <a:avLst/>
-            </a:prstGeom>
-          </p:spPr>
-          <p:txBody>
-            <a:bodyPr wrap="none">
-              <a:spAutoFit/>
-            </a:bodyPr>
-            <a:lstStyle/>
-            <a:p>
-              <a:r>
-                <a:rPr lang="en-CA" sz="1000" dirty="0"/>
-                <a:t>20.38.149.196</a:t>
-              </a:r>
-            </a:p>
-          </p:txBody>
-        </p:sp>
-      </p:grpSp>
-      <p:cxnSp>
-        <p:nvCxnSpPr>
-          <p:cNvPr id="127" name="Connector: Curved 126">
-            <a:extLst>
-              <a:ext uri="{FF2B5EF4-FFF2-40B4-BE49-F238E27FC236}">
-                <a16:creationId xmlns:a16="http://schemas.microsoft.com/office/drawing/2014/main" id="{F5FA7042-8C78-45BD-923D-5504A294FB03}"/>
-              </a:ext>
-            </a:extLst>
-          </p:cNvPr>
-          <p:cNvCxnSpPr>
-            <a:stCxn id="22" idx="3"/>
-            <a:endCxn id="140" idx="1"/>
-          </p:cNvCxnSpPr>
-          <p:nvPr/>
-        </p:nvCxnSpPr>
-        <p:spPr>
-          <a:xfrm>
-            <a:off x="5701323" y="5170531"/>
-            <a:ext cx="5718086" cy="986983"/>
-          </a:xfrm>
-          <a:prstGeom prst="curvedConnector3">
-            <a:avLst>
-              <a:gd name="adj1" fmla="val 21520"/>
-            </a:avLst>
-          </a:prstGeom>
-          <a:ln>
-            <a:solidFill>
-              <a:srgbClr val="00B050"/>
-            </a:solidFill>
-            <a:tailEnd type="triangle"/>
-          </a:ln>
-        </p:spPr>
-        <p:style>
-          <a:lnRef idx="1">
-            <a:schemeClr val="accent1"/>
-          </a:lnRef>
-          <a:fillRef idx="0">
-            <a:schemeClr val="accent1"/>
-          </a:fillRef>
-          <a:effectRef idx="0">
-            <a:schemeClr val="accent1"/>
-          </a:effectRef>
-          <a:fontRef idx="minor">
-            <a:schemeClr val="tx1"/>
-          </a:fontRef>
-        </p:style>
-      </p:cxnSp>
-      <p:sp>
-        <p:nvSpPr>
-          <p:cNvPr id="146" name="Rectangle 145">
-            <a:extLst>
-              <a:ext uri="{FF2B5EF4-FFF2-40B4-BE49-F238E27FC236}">
-                <a16:creationId xmlns:a16="http://schemas.microsoft.com/office/drawing/2014/main" id="{6D4F2BC6-07C9-48CF-81F0-916180DB56B9}"/>
-              </a:ext>
-            </a:extLst>
-          </p:cNvPr>
-          <p:cNvSpPr/>
-          <p:nvPr/>
-        </p:nvSpPr>
-        <p:spPr>
-          <a:xfrm>
-            <a:off x="8091866" y="6022527"/>
-            <a:ext cx="291841" cy="179938"/>
-          </a:xfrm>
-          <a:prstGeom prst="rect">
-            <a:avLst/>
-          </a:prstGeom>
-          <a:noFill/>
-          <a:ln>
-            <a:noFill/>
-          </a:ln>
-        </p:spPr>
-        <p:style>
-          <a:lnRef idx="2">
-            <a:schemeClr val="accent1">
-              <a:shade val="50000"/>
-            </a:schemeClr>
-          </a:lnRef>
-          <a:fillRef idx="1">
-            <a:schemeClr val="accent1"/>
-          </a:fillRef>
-          <a:effectRef idx="0">
-            <a:schemeClr val="accent1"/>
-          </a:effectRef>
-          <a:fontRef idx="minor">
-            <a:schemeClr val="lt1"/>
-          </a:fontRef>
-        </p:style>
-        <p:txBody>
-          <a:bodyPr rtlCol="0" anchor="ctr"/>
-          <a:lstStyle/>
-          <a:p>
-            <a:pPr algn="ctr"/>
-            <a:r>
-              <a:rPr lang="en-CA" sz="1200" b="1" dirty="0">
-                <a:solidFill>
-                  <a:srgbClr val="00B050"/>
-                </a:solidFill>
-              </a:rPr>
-              <a:t>9</a:t>
-            </a:r>
-          </a:p>
-        </p:txBody>
-      </p:sp>
-      <p:sp>
-        <p:nvSpPr>
-          <p:cNvPr id="147" name="Rectangle 146">
-            <a:extLst>
-              <a:ext uri="{FF2B5EF4-FFF2-40B4-BE49-F238E27FC236}">
-                <a16:creationId xmlns:a16="http://schemas.microsoft.com/office/drawing/2014/main" id="{8451734E-45C4-44FB-8D83-84B5854F35AC}"/>
-              </a:ext>
-            </a:extLst>
-          </p:cNvPr>
-          <p:cNvSpPr/>
-          <p:nvPr/>
-        </p:nvSpPr>
-        <p:spPr>
-          <a:xfrm>
-            <a:off x="8771711" y="5888667"/>
-            <a:ext cx="1753277" cy="223829"/>
-          </a:xfrm>
-          <a:prstGeom prst="rect">
-            <a:avLst/>
-          </a:prstGeom>
-          <a:noFill/>
-          <a:ln>
-            <a:noFill/>
-          </a:ln>
-        </p:spPr>
-        <p:style>
-          <a:lnRef idx="2">
-            <a:schemeClr val="accent1">
-              <a:shade val="50000"/>
-            </a:schemeClr>
-          </a:lnRef>
-          <a:fillRef idx="1">
-            <a:schemeClr val="accent1"/>
-          </a:fillRef>
-          <a:effectRef idx="0">
-            <a:schemeClr val="accent1"/>
-          </a:effectRef>
-          <a:fontRef idx="minor">
-            <a:schemeClr val="lt1"/>
-          </a:fontRef>
-        </p:style>
-        <p:txBody>
-          <a:bodyPr rtlCol="0" anchor="ctr"/>
-          <a:lstStyle/>
-          <a:p>
-            <a:r>
-              <a:rPr lang="en-CA" sz="900" dirty="0">
-                <a:solidFill>
-                  <a:srgbClr val="00B050"/>
-                </a:solidFill>
-              </a:rPr>
-              <a:t>Traffic through service endpoint</a:t>
-            </a:r>
-          </a:p>
-        </p:txBody>
-      </p:sp>
       <p:sp>
         <p:nvSpPr>
           <p:cNvPr id="148" name="Rectangle 147">
@@ -12562,8 +15071,21 @@
                   <a:schemeClr val="tx1"/>
                 </a:solidFill>
               </a:rPr>
-              <a:t>Azure Network - Firewall, DNS, Private Endpoint &amp; Service Endpoint</a:t>
+              <a:t>Azure Network - Firewall, DNS, </a:t>
             </a:r>
+            <a:r>
+              <a:rPr lang="en-CA" sz="1600" b="1" u="sng">
+                <a:solidFill>
+                  <a:schemeClr val="tx1"/>
+                </a:solidFill>
+              </a:rPr>
+              <a:t>Private Endpoint</a:t>
+            </a:r>
+            <a:endParaRPr lang="en-CA" sz="1600" b="1" u="sng" dirty="0">
+              <a:solidFill>
+                <a:schemeClr val="tx1"/>
+              </a:solidFill>
+            </a:endParaRPr>
           </a:p>
         </p:txBody>
       </p:sp>
@@ -12602,13 +15124,13 @@
             <p:nvPr/>
           </p:nvPicPr>
           <p:blipFill>
-            <a:blip r:embed="rId24">
+            <a:blip r:embed="rId22">
               <a:extLst>
                 <a:ext uri="{28A0092B-C50C-407E-A947-70E740481C1C}">
                   <a14:useLocalDpi xmlns:a14="http://schemas.microsoft.com/office/drawing/2010/main" val="0"/>
                 </a:ext>
                 <a:ext uri="{96DAC541-7B7A-43D3-8B79-37D633B846F1}">
-                  <asvg:svgBlip xmlns:asvg="http://schemas.microsoft.com/office/drawing/2016/SVG/main" r:embed="rId25"/>
+                  <asvg:svgBlip xmlns:asvg="http://schemas.microsoft.com/office/drawing/2016/SVG/main" r:embed="rId23"/>
                 </a:ext>
               </a:extLst>
             </a:blip>
@@ -12859,13 +15381,13 @@
             <p:nvPr/>
           </p:nvPicPr>
           <p:blipFill>
-            <a:blip r:embed="rId26">
+            <a:blip r:embed="rId24">
               <a:extLst>
                 <a:ext uri="{28A0092B-C50C-407E-A947-70E740481C1C}">
                   <a14:useLocalDpi xmlns:a14="http://schemas.microsoft.com/office/drawing/2010/main" val="0"/>
                 </a:ext>
                 <a:ext uri="{96DAC541-7B7A-43D3-8B79-37D633B846F1}">
-                  <asvg:svgBlip xmlns:asvg="http://schemas.microsoft.com/office/drawing/2016/SVG/main" r:embed="rId27"/>
+                  <asvg:svgBlip xmlns:asvg="http://schemas.microsoft.com/office/drawing/2016/SVG/main" r:embed="rId25"/>
                 </a:ext>
               </a:extLst>
             </a:blip>
@@ -13091,13 +15613,13 @@
             <p:nvPr/>
           </p:nvPicPr>
           <p:blipFill>
-            <a:blip r:embed="rId28">
+            <a:blip r:embed="rId26">
               <a:extLst>
                 <a:ext uri="{28A0092B-C50C-407E-A947-70E740481C1C}">
                   <a14:useLocalDpi xmlns:a14="http://schemas.microsoft.com/office/drawing/2010/main" val="0"/>
                 </a:ext>
                 <a:ext uri="{96DAC541-7B7A-43D3-8B79-37D633B846F1}">
-                  <asvg:svgBlip xmlns:asvg="http://schemas.microsoft.com/office/drawing/2016/SVG/main" r:embed="rId29"/>
+                  <asvg:svgBlip xmlns:asvg="http://schemas.microsoft.com/office/drawing/2016/SVG/main" r:embed="rId27"/>
                 </a:ext>
               </a:extLst>
             </a:blip>
@@ -13116,6 +15638,96 @@
           </p:spPr>
         </p:pic>
       </p:grpSp>
+      <p:cxnSp>
+        <p:nvCxnSpPr>
+          <p:cNvPr id="163" name="Connector: Curved 162">
+            <a:extLst>
+              <a:ext uri="{FF2B5EF4-FFF2-40B4-BE49-F238E27FC236}">
+                <a16:creationId xmlns:a16="http://schemas.microsoft.com/office/drawing/2014/main" id="{B9640A34-F9A1-41A5-BF17-D53F4E4FE9A2}"/>
+              </a:ext>
+            </a:extLst>
+          </p:cNvPr>
+          <p:cNvCxnSpPr>
+            <a:cxnSpLocks/>
+            <a:endCxn id="110" idx="1"/>
+          </p:cNvCxnSpPr>
+          <p:nvPr/>
+        </p:nvCxnSpPr>
+        <p:spPr>
+          <a:xfrm rot="16200000" flipH="1">
+            <a:off x="1808408" y="4906743"/>
+            <a:ext cx="487154" cy="437736"/>
+          </a:xfrm>
+          <a:prstGeom prst="curvedConnector2">
+            <a:avLst/>
+          </a:prstGeom>
+          <a:ln>
+            <a:solidFill>
+              <a:srgbClr val="00B050"/>
+            </a:solidFill>
+          </a:ln>
+        </p:spPr>
+        <p:style>
+          <a:lnRef idx="1">
+            <a:schemeClr val="accent1"/>
+          </a:lnRef>
+          <a:fillRef idx="0">
+            <a:schemeClr val="accent1"/>
+          </a:fillRef>
+          <a:effectRef idx="0">
+            <a:schemeClr val="accent1"/>
+          </a:effectRef>
+          <a:fontRef idx="minor">
+            <a:schemeClr val="tx1"/>
+          </a:fontRef>
+        </p:style>
+      </p:cxnSp>
+      <p:cxnSp>
+        <p:nvCxnSpPr>
+          <p:cNvPr id="174" name="Connector: Curved 173">
+            <a:extLst>
+              <a:ext uri="{FF2B5EF4-FFF2-40B4-BE49-F238E27FC236}">
+                <a16:creationId xmlns:a16="http://schemas.microsoft.com/office/drawing/2014/main" id="{655D0370-4D89-41C2-87CA-C1EE36C4326A}"/>
+              </a:ext>
+            </a:extLst>
+          </p:cNvPr>
+          <p:cNvCxnSpPr>
+            <a:stCxn id="110" idx="1"/>
+          </p:cNvCxnSpPr>
+          <p:nvPr/>
+        </p:nvCxnSpPr>
+        <p:spPr>
+          <a:xfrm rot="10800000" flipH="1">
+            <a:off x="2270853" y="4945292"/>
+            <a:ext cx="2659462" cy="423896"/>
+          </a:xfrm>
+          <a:prstGeom prst="curvedConnector3">
+            <a:avLst>
+              <a:gd name="adj1" fmla="val 48499"/>
+            </a:avLst>
+          </a:prstGeom>
+          <a:ln>
+            <a:solidFill>
+              <a:srgbClr val="00B050"/>
+            </a:solidFill>
+            <a:tailEnd type="triangle"/>
+          </a:ln>
+        </p:spPr>
+        <p:style>
+          <a:lnRef idx="1">
+            <a:schemeClr val="accent1"/>
+          </a:lnRef>
+          <a:fillRef idx="0">
+            <a:schemeClr val="accent1"/>
+          </a:fillRef>
+          <a:effectRef idx="0">
+            <a:schemeClr val="accent1"/>
+          </a:effectRef>
+          <a:fontRef idx="minor">
+            <a:schemeClr val="tx1"/>
+          </a:fontRef>
+        </p:style>
+      </p:cxnSp>
     </p:spTree>
     <p:extLst>
       <p:ext uri="{BB962C8B-B14F-4D97-AF65-F5344CB8AC3E}">

</xml_diff>